<commit_message>
Friday 5th April 2024
</commit_message>
<xml_diff>
--- a/000_91896 _ 91897 Documentation.pptx
+++ b/000_91896 _ 91897 Documentation.pptx
@@ -5,16 +5,17 @@
     <p:sldMasterId id="2147483659" r:id="rId1"/>
   </p:sldMasterIdLst>
   <p:notesMasterIdLst>
-    <p:notesMasterId r:id="rId9"/>
+    <p:notesMasterId r:id="rId10"/>
   </p:notesMasterIdLst>
   <p:sldIdLst>
     <p:sldId id="256" r:id="rId2"/>
     <p:sldId id="257" r:id="rId3"/>
-    <p:sldId id="258" r:id="rId4"/>
-    <p:sldId id="259" r:id="rId5"/>
-    <p:sldId id="260" r:id="rId6"/>
-    <p:sldId id="261" r:id="rId7"/>
-    <p:sldId id="262" r:id="rId8"/>
+    <p:sldId id="263" r:id="rId4"/>
+    <p:sldId id="258" r:id="rId5"/>
+    <p:sldId id="259" r:id="rId6"/>
+    <p:sldId id="260" r:id="rId7"/>
+    <p:sldId id="261" r:id="rId8"/>
+    <p:sldId id="262" r:id="rId9"/>
   </p:sldIdLst>
   <p:sldSz cx="9144000" cy="5143500" type="screen16x9"/>
   <p:notesSz cx="6858000" cy="9144000"/>
@@ -871,7 +872,7 @@
         </p:nvSpPr>
         <p:spPr>
           <a:xfrm>
-            <a:off x="381300" y="685800"/>
+            <a:off x="381000" y="685800"/>
             <a:ext cx="6096000" cy="3429000"/>
           </a:xfrm>
           <a:custGeom>
@@ -993,7 +994,7 @@
         </p:nvSpPr>
         <p:spPr>
           <a:xfrm>
-            <a:off x="381300" y="685800"/>
+            <a:off x="381000" y="685800"/>
             <a:ext cx="6096000" cy="3429000"/>
           </a:xfrm>
           <a:custGeom>
@@ -1091,6 +1092,137 @@
 </file>
 
 <file path=ppt/notesSlides/notesSlide3.xml><?xml version="1.0" encoding="utf-8"?>
+<p:notes xmlns:a="http://schemas.openxmlformats.org/drawingml/2006/main" xmlns:r="http://schemas.openxmlformats.org/officeDocument/2006/relationships" xmlns:p="http://schemas.openxmlformats.org/presentationml/2006/main" showMasterSp="0" showMasterPhAnim="0">
+  <p:cSld>
+    <p:spTree>
+      <p:nvGrpSpPr>
+        <p:cNvPr id="1" name="Shape 57"/>
+        <p:cNvGrpSpPr/>
+        <p:nvPr/>
+      </p:nvGrpSpPr>
+      <p:grpSpPr>
+        <a:xfrm>
+          <a:off x="0" y="0"/>
+          <a:ext cx="0" cy="0"/>
+          <a:chOff x="0" y="0"/>
+          <a:chExt cx="0" cy="0"/>
+        </a:xfrm>
+      </p:grpSpPr>
+      <p:sp>
+        <p:nvSpPr>
+          <p:cNvPr id="58" name="Google Shape;58;p2:notes"/>
+          <p:cNvSpPr>
+            <a:spLocks noGrp="1" noRot="1" noChangeAspect="1"/>
+          </p:cNvSpPr>
+          <p:nvPr>
+            <p:ph type="sldImg" idx="2"/>
+          </p:nvPr>
+        </p:nvSpPr>
+        <p:spPr>
+          <a:xfrm>
+            <a:off x="381000" y="685800"/>
+            <a:ext cx="6096000" cy="3429000"/>
+          </a:xfrm>
+          <a:custGeom>
+            <a:avLst/>
+            <a:gdLst/>
+            <a:ahLst/>
+            <a:cxnLst/>
+            <a:rect l="l" t="t" r="r" b="b"/>
+            <a:pathLst>
+              <a:path w="120000" h="120000" extrusionOk="0">
+                <a:moveTo>
+                  <a:pt x="0" y="0"/>
+                </a:moveTo>
+                <a:lnTo>
+                  <a:pt x="120000" y="0"/>
+                </a:lnTo>
+                <a:lnTo>
+                  <a:pt x="120000" y="120000"/>
+                </a:lnTo>
+                <a:lnTo>
+                  <a:pt x="0" y="120000"/>
+                </a:lnTo>
+                <a:close/>
+              </a:path>
+            </a:pathLst>
+          </a:custGeom>
+          <a:noFill/>
+          <a:ln w="9525" cap="flat" cmpd="sng">
+            <a:solidFill>
+              <a:srgbClr val="000000"/>
+            </a:solidFill>
+            <a:prstDash val="solid"/>
+            <a:round/>
+            <a:headEnd type="none" w="sm" len="sm"/>
+            <a:tailEnd type="none" w="sm" len="sm"/>
+          </a:ln>
+        </p:spPr>
+      </p:sp>
+      <p:sp>
+        <p:nvSpPr>
+          <p:cNvPr id="59" name="Google Shape;59;p2:notes"/>
+          <p:cNvSpPr txBox="1">
+            <a:spLocks noGrp="1"/>
+          </p:cNvSpPr>
+          <p:nvPr>
+            <p:ph type="body" idx="1"/>
+          </p:nvPr>
+        </p:nvSpPr>
+        <p:spPr>
+          <a:xfrm>
+            <a:off x="685800" y="4343400"/>
+            <a:ext cx="5486400" cy="4114800"/>
+          </a:xfrm>
+          <a:prstGeom prst="rect">
+            <a:avLst/>
+          </a:prstGeom>
+          <a:noFill/>
+          <a:ln>
+            <a:noFill/>
+          </a:ln>
+        </p:spPr>
+        <p:txBody>
+          <a:bodyPr spcFirstLastPara="1" wrap="square" lIns="91425" tIns="91425" rIns="91425" bIns="91425" anchor="t" anchorCtr="0">
+            <a:noAutofit/>
+          </a:bodyPr>
+          <a:lstStyle/>
+          <a:p>
+            <a:pPr marL="0" lvl="0" indent="0" algn="l" rtl="0">
+              <a:lnSpc>
+                <a:spcPct val="100000"/>
+              </a:lnSpc>
+              <a:spcBef>
+                <a:spcPts val="0"/>
+              </a:spcBef>
+              <a:spcAft>
+                <a:spcPts val="0"/>
+              </a:spcAft>
+              <a:buSzPts val="1100"/>
+              <a:buNone/>
+            </a:pPr>
+            <a:r>
+              <a:rPr lang="en"/>
+              <a:t>Explain the relevant implications here.  Then as you work, develop your code, discuss how the implications are being met.</a:t>
+            </a:r>
+            <a:endParaRPr/>
+          </a:p>
+        </p:txBody>
+      </p:sp>
+    </p:spTree>
+    <p:extLst>
+      <p:ext uri="{BB962C8B-B14F-4D97-AF65-F5344CB8AC3E}">
+        <p14:creationId xmlns:p14="http://schemas.microsoft.com/office/powerpoint/2010/main" val="3761375932"/>
+      </p:ext>
+    </p:extLst>
+  </p:cSld>
+  <p:clrMapOvr>
+    <a:masterClrMapping/>
+  </p:clrMapOvr>
+</p:notes>
+</file>
+
+<file path=ppt/notesSlides/notesSlide4.xml><?xml version="1.0" encoding="utf-8"?>
 <p:notes xmlns:a="http://schemas.openxmlformats.org/drawingml/2006/main" xmlns:r="http://schemas.openxmlformats.org/officeDocument/2006/relationships" xmlns:p="http://schemas.openxmlformats.org/presentationml/2006/main" showMasterSp="0" showMasterPhAnim="0">
   <p:cSld>
     <p:spTree>
@@ -1236,7 +1368,7 @@
 </p:notes>
 </file>
 
-<file path=ppt/notesSlides/notesSlide4.xml><?xml version="1.0" encoding="utf-8"?>
+<file path=ppt/notesSlides/notesSlide5.xml><?xml version="1.0" encoding="utf-8"?>
 <p:notes xmlns:a="http://schemas.openxmlformats.org/drawingml/2006/main" xmlns:r="http://schemas.openxmlformats.org/officeDocument/2006/relationships" xmlns:p="http://schemas.openxmlformats.org/presentationml/2006/main" showMasterSp="0" showMasterPhAnim="0">
   <p:cSld>
     <p:spTree>
@@ -1358,7 +1490,7 @@
 </p:notes>
 </file>
 
-<file path=ppt/notesSlides/notesSlide5.xml><?xml version="1.0" encoding="utf-8"?>
+<file path=ppt/notesSlides/notesSlide6.xml><?xml version="1.0" encoding="utf-8"?>
 <p:notes xmlns:a="http://schemas.openxmlformats.org/drawingml/2006/main" xmlns:r="http://schemas.openxmlformats.org/officeDocument/2006/relationships" xmlns:p="http://schemas.openxmlformats.org/presentationml/2006/main" showMasterSp="0" showMasterPhAnim="0">
   <p:cSld>
     <p:spTree>
@@ -1480,7 +1612,7 @@
 </p:notes>
 </file>
 
-<file path=ppt/notesSlides/notesSlide6.xml><?xml version="1.0" encoding="utf-8"?>
+<file path=ppt/notesSlides/notesSlide7.xml><?xml version="1.0" encoding="utf-8"?>
 <p:notes xmlns:a="http://schemas.openxmlformats.org/drawingml/2006/main" xmlns:r="http://schemas.openxmlformats.org/officeDocument/2006/relationships" xmlns:p="http://schemas.openxmlformats.org/presentationml/2006/main" showMasterSp="0" showMasterPhAnim="0">
   <p:cSld>
     <p:spTree>
@@ -1626,7 +1758,7 @@
 </p:notes>
 </file>
 
-<file path=ppt/notesSlides/notesSlide7.xml><?xml version="1.0" encoding="utf-8"?>
+<file path=ppt/notesSlides/notesSlide8.xml><?xml version="1.0" encoding="utf-8"?>
 <p:notes xmlns:a="http://schemas.openxmlformats.org/drawingml/2006/main" xmlns:r="http://schemas.openxmlformats.org/officeDocument/2006/relationships" xmlns:p="http://schemas.openxmlformats.org/presentationml/2006/main" showMasterSp="0" showMasterPhAnim="0">
   <p:cSld>
     <p:spTree>
@@ -9599,7 +9731,7 @@
           </a:bodyPr>
           <a:lstStyle/>
           <a:p>
-            <a:pPr marL="0" lvl="0" indent="0" algn="l" rtl="0">
+            <a:pPr marL="0" lvl="0" indent="0" rtl="0">
               <a:lnSpc>
                 <a:spcPct val="100000"/>
               </a:lnSpc>
@@ -9617,14 +9749,23 @@
               <a:buNone/>
             </a:pPr>
             <a:r>
-              <a:rPr lang="en" sz="2000" b="1">
+              <a:rPr lang="en" sz="2000" b="1" dirty="0">
                 <a:solidFill>
                   <a:srgbClr val="274E13"/>
                 </a:solidFill>
               </a:rPr>
               <a:t>Link to github Repository: </a:t>
             </a:r>
-            <a:endParaRPr sz="2000" b="1">
+            <a:r>
+              <a:rPr lang="en-NZ" sz="2000" b="1" dirty="0">
+                <a:solidFill>
+                  <a:srgbClr val="274E13"/>
+                </a:solidFill>
+                <a:hlinkClick r:id="rId3"/>
+              </a:rPr>
+              <a:t>https://github.com/21308/AS91896---AS91897</a:t>
+            </a:r>
+            <a:endParaRPr sz="2000" b="1" dirty="0">
               <a:solidFill>
                 <a:srgbClr val="274E13"/>
               </a:solidFill>
@@ -9648,7 +9789,7 @@
               <a:buFont typeface="Arial"/>
               <a:buNone/>
             </a:pPr>
-            <a:endParaRPr sz="2000">
+            <a:endParaRPr sz="2000" dirty="0">
               <a:solidFill>
                 <a:srgbClr val="274E13"/>
               </a:solidFill>
@@ -9673,14 +9814,23 @@
               <a:buNone/>
             </a:pPr>
             <a:r>
-              <a:rPr lang="en" sz="2000" b="1">
+              <a:rPr lang="en" sz="2000" b="1" dirty="0">
                 <a:solidFill>
                   <a:srgbClr val="274E13"/>
                 </a:solidFill>
               </a:rPr>
-              <a:t>Links to trello board / project management tools:</a:t>
+              <a:t>Links to trello board / project management tools: </a:t>
             </a:r>
-            <a:endParaRPr sz="2000"/>
+            <a:r>
+              <a:rPr lang="en-NZ" sz="2000" b="1" dirty="0">
+                <a:solidFill>
+                  <a:srgbClr val="274E13"/>
+                </a:solidFill>
+                <a:hlinkClick r:id="rId4"/>
+              </a:rPr>
+              <a:t>https://trello.com/b/VkkabcYw/as-91896-91897</a:t>
+            </a:r>
+            <a:endParaRPr sz="2000" dirty="0"/>
           </a:p>
         </p:txBody>
       </p:sp>
@@ -9840,16 +9990,16 @@
               <a:buNone/>
             </a:pPr>
             <a:r>
-              <a:rPr lang="en" b="1">
-                <a:solidFill>
-                  <a:srgbClr val="4C1130"/>
+              <a:rPr lang="en" b="1" dirty="0">
+                <a:solidFill>
+                  <a:srgbClr val="7030A0"/>
                 </a:solidFill>
               </a:rPr>
               <a:t>Relevant Implications</a:t>
             </a:r>
-            <a:endParaRPr b="1">
+            <a:endParaRPr b="1" dirty="0">
               <a:solidFill>
-                <a:srgbClr val="4C1130"/>
+                <a:srgbClr val="7030A0"/>
               </a:solidFill>
             </a:endParaRPr>
           </a:p>
@@ -9867,8 +10017,8 @@
         </p:nvSpPr>
         <p:spPr>
           <a:xfrm>
-            <a:off x="311700" y="1165725"/>
-            <a:ext cx="8520600" cy="3416400"/>
+            <a:off x="311700" y="1165724"/>
+            <a:ext cx="8520600" cy="3857380"/>
           </a:xfrm>
           <a:prstGeom prst="rect">
             <a:avLst/>
@@ -9902,31 +10052,85 @@
               <a:buNone/>
             </a:pPr>
             <a:r>
-              <a:rPr lang="en" i="1" dirty="0">
-                <a:solidFill>
-                  <a:srgbClr val="741B47"/>
+              <a:rPr lang="en-US" dirty="0">
+                <a:solidFill>
+                  <a:srgbClr val="7030A0"/>
                 </a:solidFill>
               </a:rPr>
-              <a:t>Explain the relevant implications here.  Please </a:t>
+              <a:t>Accessibility – This is relevant to the development of my code because I will make sure that my code is private by making sure that my code can only be accessed on Visual Studio Code to be able to run it. I have made sure my code can be accessed by people with different disabilities such as color-blinded and dyslexic people due to the way I have </a:t>
             </a:r>
             <a:r>
-              <a:rPr lang="en" i="1" u="sng" dirty="0">
-                <a:solidFill>
-                  <a:schemeClr val="hlink"/>
-                </a:solidFill>
-                <a:hlinkClick r:id="rId3"/>
+              <a:rPr lang="en-US" dirty="0" err="1">
+                <a:solidFill>
+                  <a:srgbClr val="7030A0"/>
+                </a:solidFill>
               </a:rPr>
-              <a:t>watch this video</a:t>
+              <a:t>layed</a:t>
             </a:r>
             <a:r>
-              <a:rPr lang="en" i="1" dirty="0">
-                <a:solidFill>
-                  <a:srgbClr val="741B47"/>
+              <a:rPr lang="en-US" dirty="0">
+                <a:solidFill>
+                  <a:srgbClr val="7030A0"/>
                 </a:solidFill>
               </a:rPr>
-              <a:t> to learn how to do this.</a:t>
+              <a:t> everything out and it is readable. The code does not consist of much color so it should be fine for color-blinded people to use my code to their abilities. </a:t>
             </a:r>
-            <a:endParaRPr dirty="0"/>
+          </a:p>
+          <a:p>
+            <a:pPr marL="0" lvl="0" indent="0" algn="l" rtl="0">
+              <a:lnSpc>
+                <a:spcPct val="100000"/>
+              </a:lnSpc>
+              <a:spcBef>
+                <a:spcPts val="0"/>
+              </a:spcBef>
+              <a:spcAft>
+                <a:spcPts val="0"/>
+              </a:spcAft>
+              <a:buClr>
+                <a:schemeClr val="dk1"/>
+              </a:buClr>
+              <a:buSzPts val="1100"/>
+              <a:buFont typeface="Arial"/>
+              <a:buNone/>
+            </a:pPr>
+            <a:endParaRPr lang="en-US" dirty="0">
+              <a:solidFill>
+                <a:srgbClr val="7030A0"/>
+              </a:solidFill>
+            </a:endParaRPr>
+          </a:p>
+          <a:p>
+            <a:pPr marL="0" lvl="0" indent="0" algn="l" rtl="0">
+              <a:lnSpc>
+                <a:spcPct val="100000"/>
+              </a:lnSpc>
+              <a:spcBef>
+                <a:spcPts val="0"/>
+              </a:spcBef>
+              <a:spcAft>
+                <a:spcPts val="0"/>
+              </a:spcAft>
+              <a:buClr>
+                <a:schemeClr val="dk1"/>
+              </a:buClr>
+              <a:buSzPts val="1100"/>
+              <a:buFont typeface="Arial"/>
+              <a:buNone/>
+            </a:pPr>
+            <a:r>
+              <a:rPr lang="en-US" dirty="0">
+                <a:solidFill>
+                  <a:srgbClr val="7030A0"/>
+                </a:solidFill>
+              </a:rPr>
+              <a:t>Ethics – This is relevant to the development of my code because I have checked that my code does not cause any harm to anyone in any way, I checked that my code does not give out any irrelevant information other than printing the inputs that the user inputs. I included this in my code because it should not cause any harm to any one it comes across nor is it violent or it does not exploit users either.</a:t>
+            </a:r>
+            <a:endParaRPr dirty="0">
+              <a:solidFill>
+                <a:srgbClr val="7030A0"/>
+              </a:solidFill>
+            </a:endParaRPr>
           </a:p>
         </p:txBody>
       </p:sp>
@@ -9939,6 +10143,215 @@
 </file>
 
 <file path=ppt/slides/slide3.xml><?xml version="1.0" encoding="utf-8"?>
+<p:sld xmlns:a="http://schemas.openxmlformats.org/drawingml/2006/main" xmlns:r="http://schemas.openxmlformats.org/officeDocument/2006/relationships" xmlns:p="http://schemas.openxmlformats.org/presentationml/2006/main">
+  <p:cSld>
+    <p:bg>
+      <p:bgPr>
+        <a:solidFill>
+          <a:srgbClr val="EAD1DC"/>
+        </a:solidFill>
+        <a:effectLst/>
+      </p:bgPr>
+    </p:bg>
+    <p:spTree>
+      <p:nvGrpSpPr>
+        <p:cNvPr id="1" name="Shape 60"/>
+        <p:cNvGrpSpPr/>
+        <p:nvPr/>
+      </p:nvGrpSpPr>
+      <p:grpSpPr>
+        <a:xfrm>
+          <a:off x="0" y="0"/>
+          <a:ext cx="0" cy="0"/>
+          <a:chOff x="0" y="0"/>
+          <a:chExt cx="0" cy="0"/>
+        </a:xfrm>
+      </p:grpSpPr>
+      <p:sp>
+        <p:nvSpPr>
+          <p:cNvPr id="61" name="Google Shape;61;p14"/>
+          <p:cNvSpPr txBox="1">
+            <a:spLocks noGrp="1"/>
+          </p:cNvSpPr>
+          <p:nvPr>
+            <p:ph type="title"/>
+          </p:nvPr>
+        </p:nvSpPr>
+        <p:spPr>
+          <a:xfrm>
+            <a:off x="311700" y="445025"/>
+            <a:ext cx="8520600" cy="572700"/>
+          </a:xfrm>
+          <a:prstGeom prst="rect">
+            <a:avLst/>
+          </a:prstGeom>
+          <a:noFill/>
+          <a:ln>
+            <a:noFill/>
+          </a:ln>
+        </p:spPr>
+        <p:txBody>
+          <a:bodyPr spcFirstLastPara="1" wrap="square" lIns="91425" tIns="91425" rIns="91425" bIns="91425" anchor="t" anchorCtr="0">
+            <a:noAutofit/>
+          </a:bodyPr>
+          <a:lstStyle/>
+          <a:p>
+            <a:pPr marL="0" lvl="0" indent="0" algn="l" rtl="0">
+              <a:lnSpc>
+                <a:spcPct val="100000"/>
+              </a:lnSpc>
+              <a:spcBef>
+                <a:spcPts val="0"/>
+              </a:spcBef>
+              <a:spcAft>
+                <a:spcPts val="0"/>
+              </a:spcAft>
+              <a:buSzPts val="2800"/>
+              <a:buNone/>
+            </a:pPr>
+            <a:r>
+              <a:rPr lang="en" b="1" dirty="0">
+                <a:solidFill>
+                  <a:srgbClr val="7030A0"/>
+                </a:solidFill>
+              </a:rPr>
+              <a:t>Relevant Implications</a:t>
+            </a:r>
+            <a:endParaRPr b="1" dirty="0">
+              <a:solidFill>
+                <a:srgbClr val="7030A0"/>
+              </a:solidFill>
+            </a:endParaRPr>
+          </a:p>
+        </p:txBody>
+      </p:sp>
+      <p:sp>
+        <p:nvSpPr>
+          <p:cNvPr id="62" name="Google Shape;62;p14"/>
+          <p:cNvSpPr txBox="1">
+            <a:spLocks noGrp="1"/>
+          </p:cNvSpPr>
+          <p:nvPr>
+            <p:ph type="body" idx="1"/>
+          </p:nvPr>
+        </p:nvSpPr>
+        <p:spPr>
+          <a:xfrm>
+            <a:off x="311700" y="1165724"/>
+            <a:ext cx="8520600" cy="3977776"/>
+          </a:xfrm>
+          <a:prstGeom prst="rect">
+            <a:avLst/>
+          </a:prstGeom>
+          <a:noFill/>
+          <a:ln>
+            <a:noFill/>
+          </a:ln>
+        </p:spPr>
+        <p:txBody>
+          <a:bodyPr spcFirstLastPara="1" wrap="square" lIns="91425" tIns="91425" rIns="91425" bIns="91425" anchor="t" anchorCtr="0">
+            <a:noAutofit/>
+          </a:bodyPr>
+          <a:lstStyle/>
+          <a:p>
+            <a:pPr marL="0" lvl="0" indent="0" algn="l" rtl="0">
+              <a:lnSpc>
+                <a:spcPct val="100000"/>
+              </a:lnSpc>
+              <a:spcBef>
+                <a:spcPts val="0"/>
+              </a:spcBef>
+              <a:spcAft>
+                <a:spcPts val="0"/>
+              </a:spcAft>
+              <a:buClr>
+                <a:schemeClr val="dk1"/>
+              </a:buClr>
+              <a:buSzPts val="1100"/>
+              <a:buFont typeface="Arial"/>
+              <a:buNone/>
+            </a:pPr>
+            <a:r>
+              <a:rPr lang="en-US" dirty="0">
+                <a:solidFill>
+                  <a:srgbClr val="7030A0"/>
+                </a:solidFill>
+              </a:rPr>
+              <a:t>Usability – This is relevant to the development of my code because I checked that my code is labeled properly and I made sure that it makes sense to the user for how they operate their inputs to the code. I have checked that I set up my code correctly and that it is easy for the user to use and that my code is able to avoid any errors that may come across when the user inputs their desired input. I  included this in my code because I made sure that my code is easy to run / be usable to anyone who tries the code without them needing instructions or having videos to figure out how to operate the code. </a:t>
+            </a:r>
+          </a:p>
+          <a:p>
+            <a:pPr marL="0" lvl="0" indent="0" algn="l" rtl="0">
+              <a:lnSpc>
+                <a:spcPct val="100000"/>
+              </a:lnSpc>
+              <a:spcBef>
+                <a:spcPts val="0"/>
+              </a:spcBef>
+              <a:spcAft>
+                <a:spcPts val="0"/>
+              </a:spcAft>
+              <a:buClr>
+                <a:schemeClr val="dk1"/>
+              </a:buClr>
+              <a:buSzPts val="1100"/>
+              <a:buFont typeface="Arial"/>
+              <a:buNone/>
+            </a:pPr>
+            <a:endParaRPr lang="en-US" dirty="0">
+              <a:solidFill>
+                <a:srgbClr val="7030A0"/>
+              </a:solidFill>
+            </a:endParaRPr>
+          </a:p>
+          <a:p>
+            <a:pPr marL="0" lvl="0" indent="0" algn="l" rtl="0">
+              <a:lnSpc>
+                <a:spcPct val="100000"/>
+              </a:lnSpc>
+              <a:spcBef>
+                <a:spcPts val="0"/>
+              </a:spcBef>
+              <a:spcAft>
+                <a:spcPts val="0"/>
+              </a:spcAft>
+              <a:buClr>
+                <a:schemeClr val="dk1"/>
+              </a:buClr>
+              <a:buSzPts val="1100"/>
+              <a:buFont typeface="Arial"/>
+              <a:buNone/>
+            </a:pPr>
+            <a:r>
+              <a:rPr lang="en-US" dirty="0">
+                <a:solidFill>
+                  <a:srgbClr val="7030A0"/>
+                </a:solidFill>
+              </a:rPr>
+              <a:t>Functionality – This is relevant to the development of my code because I have checked that my code is able to function well due to the way I have coded my code for it to function properly. I included this implication in my code because I tested everything to make sure that the code functioned well as intended and that the code was bugless that would disrupt or crash the code at any point in time. </a:t>
+            </a:r>
+            <a:endParaRPr dirty="0">
+              <a:solidFill>
+                <a:srgbClr val="7030A0"/>
+              </a:solidFill>
+            </a:endParaRPr>
+          </a:p>
+        </p:txBody>
+      </p:sp>
+    </p:spTree>
+    <p:extLst>
+      <p:ext uri="{BB962C8B-B14F-4D97-AF65-F5344CB8AC3E}">
+        <p14:creationId xmlns:p14="http://schemas.microsoft.com/office/powerpoint/2010/main" val="1056566141"/>
+      </p:ext>
+    </p:extLst>
+  </p:cSld>
+  <p:clrMapOvr>
+    <a:masterClrMapping/>
+  </p:clrMapOvr>
+</p:sld>
+</file>
+
+<file path=ppt/slides/slide4.xml><?xml version="1.0" encoding="utf-8"?>
 <p:sld xmlns:a="http://schemas.openxmlformats.org/drawingml/2006/main" xmlns:r="http://schemas.openxmlformats.org/officeDocument/2006/relationships" xmlns:p="http://schemas.openxmlformats.org/presentationml/2006/main">
   <p:cSld>
     <p:bg>
@@ -10071,7 +10484,7 @@
 </p:sld>
 </file>
 
-<file path=ppt/slides/slide4.xml><?xml version="1.0" encoding="utf-8"?>
+<file path=ppt/slides/slide5.xml><?xml version="1.0" encoding="utf-8"?>
 <p:sld xmlns:a="http://schemas.openxmlformats.org/drawingml/2006/main" xmlns:r="http://schemas.openxmlformats.org/officeDocument/2006/relationships" xmlns:p="http://schemas.openxmlformats.org/presentationml/2006/main">
   <p:cSld>
     <p:bg>
@@ -10154,7 +10567,7 @@
 </p:sld>
 </file>
 
-<file path=ppt/slides/slide5.xml><?xml version="1.0" encoding="utf-8"?>
+<file path=ppt/slides/slide6.xml><?xml version="1.0" encoding="utf-8"?>
 <p:sld xmlns:a="http://schemas.openxmlformats.org/drawingml/2006/main" xmlns:r="http://schemas.openxmlformats.org/officeDocument/2006/relationships" xmlns:p="http://schemas.openxmlformats.org/presentationml/2006/main">
   <p:cSld>
     <p:spTree>
@@ -10404,7 +10817,7 @@
 </p:sld>
 </file>
 
-<file path=ppt/slides/slide6.xml><?xml version="1.0" encoding="utf-8"?>
+<file path=ppt/slides/slide7.xml><?xml version="1.0" encoding="utf-8"?>
 <p:sld xmlns:a="http://schemas.openxmlformats.org/drawingml/2006/main" xmlns:r="http://schemas.openxmlformats.org/officeDocument/2006/relationships" xmlns:p="http://schemas.openxmlformats.org/presentationml/2006/main">
   <p:cSld>
     <p:bg>
@@ -10537,7 +10950,7 @@
 </p:sld>
 </file>
 
-<file path=ppt/slides/slide7.xml><?xml version="1.0" encoding="utf-8"?>
+<file path=ppt/slides/slide8.xml><?xml version="1.0" encoding="utf-8"?>
 <p:sld xmlns:a="http://schemas.openxmlformats.org/drawingml/2006/main" xmlns:r="http://schemas.openxmlformats.org/officeDocument/2006/relationships" xmlns:p="http://schemas.openxmlformats.org/presentationml/2006/main">
   <p:cSld>
     <p:bg>

</xml_diff>

<commit_message>
Wednesday 8 May 2024
</commit_message>
<xml_diff>
--- a/000_91896 _ 91897 Documentation.pptx
+++ b/000_91896 _ 91897 Documentation.pptx
@@ -2,20 +2,22 @@
 <file path=ppt/presentation.xml><?xml version="1.0" encoding="utf-8"?>
 <p:presentation xmlns:a="http://schemas.openxmlformats.org/drawingml/2006/main" xmlns:r="http://schemas.openxmlformats.org/officeDocument/2006/relationships" xmlns:p="http://schemas.openxmlformats.org/presentationml/2006/main" strictFirstAndLastChars="0" saveSubsetFonts="1" autoCompressPictures="0">
   <p:sldMasterIdLst>
-    <p:sldMasterId id="2147483659" r:id="rId1"/>
+    <p:sldMasterId id="2147483659" r:id="rId4"/>
   </p:sldMasterIdLst>
   <p:notesMasterIdLst>
-    <p:notesMasterId r:id="rId10"/>
+    <p:notesMasterId r:id="rId15"/>
   </p:notesMasterIdLst>
   <p:sldIdLst>
-    <p:sldId id="256" r:id="rId2"/>
-    <p:sldId id="257" r:id="rId3"/>
-    <p:sldId id="263" r:id="rId4"/>
-    <p:sldId id="258" r:id="rId5"/>
-    <p:sldId id="259" r:id="rId6"/>
-    <p:sldId id="260" r:id="rId7"/>
-    <p:sldId id="261" r:id="rId8"/>
-    <p:sldId id="262" r:id="rId9"/>
+    <p:sldId id="256" r:id="rId5"/>
+    <p:sldId id="257" r:id="rId6"/>
+    <p:sldId id="263" r:id="rId7"/>
+    <p:sldId id="258" r:id="rId8"/>
+    <p:sldId id="259" r:id="rId9"/>
+    <p:sldId id="260" r:id="rId10"/>
+    <p:sldId id="264" r:id="rId11"/>
+    <p:sldId id="265" r:id="rId12"/>
+    <p:sldId id="261" r:id="rId13"/>
+    <p:sldId id="262" r:id="rId14"/>
   </p:sldIdLst>
   <p:sldSz cx="9144000" cy="5143500" type="screen16x9"/>
   <p:notesSz cx="6858000" cy="9144000"/>
@@ -965,6 +967,132 @@
 </p:notes>
 </file>
 
+<file path=ppt/notesSlides/notesSlide10.xml><?xml version="1.0" encoding="utf-8"?>
+<p:notes xmlns:a="http://schemas.openxmlformats.org/drawingml/2006/main" xmlns:r="http://schemas.openxmlformats.org/officeDocument/2006/relationships" xmlns:p="http://schemas.openxmlformats.org/presentationml/2006/main" showMasterSp="0" showMasterPhAnim="0">
+  <p:cSld>
+    <p:spTree>
+      <p:nvGrpSpPr>
+        <p:cNvPr id="1" name="Shape 86"/>
+        <p:cNvGrpSpPr/>
+        <p:nvPr/>
+      </p:nvGrpSpPr>
+      <p:grpSpPr>
+        <a:xfrm>
+          <a:off x="0" y="0"/>
+          <a:ext cx="0" cy="0"/>
+          <a:chOff x="0" y="0"/>
+          <a:chExt cx="0" cy="0"/>
+        </a:xfrm>
+      </p:grpSpPr>
+      <p:sp>
+        <p:nvSpPr>
+          <p:cNvPr id="87" name="Google Shape;87;p7:notes"/>
+          <p:cNvSpPr>
+            <a:spLocks noGrp="1" noRot="1" noChangeAspect="1"/>
+          </p:cNvSpPr>
+          <p:nvPr>
+            <p:ph type="sldImg" idx="2"/>
+          </p:nvPr>
+        </p:nvSpPr>
+        <p:spPr>
+          <a:xfrm>
+            <a:off x="381300" y="685800"/>
+            <a:ext cx="6096000" cy="3429000"/>
+          </a:xfrm>
+          <a:custGeom>
+            <a:avLst/>
+            <a:gdLst/>
+            <a:ahLst/>
+            <a:cxnLst/>
+            <a:rect l="l" t="t" r="r" b="b"/>
+            <a:pathLst>
+              <a:path w="120000" h="120000" extrusionOk="0">
+                <a:moveTo>
+                  <a:pt x="0" y="0"/>
+                </a:moveTo>
+                <a:lnTo>
+                  <a:pt x="120000" y="0"/>
+                </a:lnTo>
+                <a:lnTo>
+                  <a:pt x="120000" y="120000"/>
+                </a:lnTo>
+                <a:lnTo>
+                  <a:pt x="0" y="120000"/>
+                </a:lnTo>
+                <a:close/>
+              </a:path>
+            </a:pathLst>
+          </a:custGeom>
+          <a:noFill/>
+          <a:ln w="9525" cap="flat" cmpd="sng">
+            <a:solidFill>
+              <a:srgbClr val="000000"/>
+            </a:solidFill>
+            <a:prstDash val="solid"/>
+            <a:round/>
+            <a:headEnd type="none" w="sm" len="sm"/>
+            <a:tailEnd type="none" w="sm" len="sm"/>
+          </a:ln>
+        </p:spPr>
+      </p:sp>
+      <p:sp>
+        <p:nvSpPr>
+          <p:cNvPr id="88" name="Google Shape;88;p7:notes"/>
+          <p:cNvSpPr txBox="1">
+            <a:spLocks noGrp="1"/>
+          </p:cNvSpPr>
+          <p:nvPr>
+            <p:ph type="body" idx="1"/>
+          </p:nvPr>
+        </p:nvSpPr>
+        <p:spPr>
+          <a:xfrm>
+            <a:off x="685800" y="4343400"/>
+            <a:ext cx="5486400" cy="4114800"/>
+          </a:xfrm>
+          <a:prstGeom prst="rect">
+            <a:avLst/>
+          </a:prstGeom>
+          <a:noFill/>
+          <a:ln>
+            <a:noFill/>
+          </a:ln>
+        </p:spPr>
+        <p:txBody>
+          <a:bodyPr spcFirstLastPara="1" wrap="square" lIns="91425" tIns="91425" rIns="91425" bIns="91425" anchor="t" anchorCtr="0">
+            <a:noAutofit/>
+          </a:bodyPr>
+          <a:lstStyle/>
+          <a:p>
+            <a:pPr marL="0" lvl="0" indent="0" algn="l" rtl="0">
+              <a:lnSpc>
+                <a:spcPct val="100000"/>
+              </a:lnSpc>
+              <a:spcBef>
+                <a:spcPts val="0"/>
+              </a:spcBef>
+              <a:spcAft>
+                <a:spcPts val="0"/>
+              </a:spcAft>
+              <a:buSzPts val="1100"/>
+              <a:buNone/>
+            </a:pPr>
+            <a:r>
+              <a:rPr lang="en"/>
+              <a:t>Discusses how the information from planning, testing and trialling of components assisted in the development of a high-quality outcome</a:t>
+            </a:r>
+            <a:endParaRPr/>
+          </a:p>
+        </p:txBody>
+      </p:sp>
+    </p:spTree>
+  </p:cSld>
+  <p:clrMapOvr>
+    <a:masterClrMapping/>
+  </p:clrMapOvr>
+</p:notes>
+</file>
+
 <file path=ppt/notesSlides/notesSlide2.xml><?xml version="1.0" encoding="utf-8"?>
 <p:notes xmlns:a="http://schemas.openxmlformats.org/drawingml/2006/main" xmlns:r="http://schemas.openxmlformats.org/officeDocument/2006/relationships" xmlns:p="http://schemas.openxmlformats.org/presentationml/2006/main" showMasterSp="0" showMasterPhAnim="0">
   <p:cSld>
@@ -1251,7 +1379,7 @@
         </p:nvSpPr>
         <p:spPr>
           <a:xfrm>
-            <a:off x="381300" y="685800"/>
+            <a:off x="381000" y="685800"/>
             <a:ext cx="6096000" cy="3429000"/>
           </a:xfrm>
           <a:custGeom>
@@ -1397,7 +1525,7 @@
         </p:nvSpPr>
         <p:spPr>
           <a:xfrm>
-            <a:off x="381300" y="685800"/>
+            <a:off x="381000" y="685800"/>
             <a:ext cx="6096000" cy="3429000"/>
           </a:xfrm>
           <a:custGeom>
@@ -1519,7 +1647,7 @@
         </p:nvSpPr>
         <p:spPr>
           <a:xfrm>
-            <a:off x="381300" y="685800"/>
+            <a:off x="381000" y="685800"/>
             <a:ext cx="6096000" cy="3429000"/>
           </a:xfrm>
           <a:custGeom>
@@ -1613,6 +1741,260 @@
 </file>
 
 <file path=ppt/notesSlides/notesSlide7.xml><?xml version="1.0" encoding="utf-8"?>
+<p:notes xmlns:a="http://schemas.openxmlformats.org/drawingml/2006/main" xmlns:r="http://schemas.openxmlformats.org/officeDocument/2006/relationships" xmlns:p="http://schemas.openxmlformats.org/presentationml/2006/main" showMasterSp="0" showMasterPhAnim="0">
+  <p:cSld>
+    <p:spTree>
+      <p:nvGrpSpPr>
+        <p:cNvPr id="1" name="Shape 74"/>
+        <p:cNvGrpSpPr/>
+        <p:nvPr/>
+      </p:nvGrpSpPr>
+      <p:grpSpPr>
+        <a:xfrm>
+          <a:off x="0" y="0"/>
+          <a:ext cx="0" cy="0"/>
+          <a:chOff x="0" y="0"/>
+          <a:chExt cx="0" cy="0"/>
+        </a:xfrm>
+      </p:grpSpPr>
+      <p:sp>
+        <p:nvSpPr>
+          <p:cNvPr id="75" name="Google Shape;75;p5:notes"/>
+          <p:cNvSpPr>
+            <a:spLocks noGrp="1" noRot="1" noChangeAspect="1"/>
+          </p:cNvSpPr>
+          <p:nvPr>
+            <p:ph type="sldImg" idx="2"/>
+          </p:nvPr>
+        </p:nvSpPr>
+        <p:spPr>
+          <a:xfrm>
+            <a:off x="381000" y="685800"/>
+            <a:ext cx="6096000" cy="3429000"/>
+          </a:xfrm>
+          <a:custGeom>
+            <a:avLst/>
+            <a:gdLst/>
+            <a:ahLst/>
+            <a:cxnLst/>
+            <a:rect l="l" t="t" r="r" b="b"/>
+            <a:pathLst>
+              <a:path w="120000" h="120000" extrusionOk="0">
+                <a:moveTo>
+                  <a:pt x="0" y="0"/>
+                </a:moveTo>
+                <a:lnTo>
+                  <a:pt x="120000" y="0"/>
+                </a:lnTo>
+                <a:lnTo>
+                  <a:pt x="120000" y="120000"/>
+                </a:lnTo>
+                <a:lnTo>
+                  <a:pt x="0" y="120000"/>
+                </a:lnTo>
+                <a:close/>
+              </a:path>
+            </a:pathLst>
+          </a:custGeom>
+          <a:noFill/>
+          <a:ln w="9525" cap="flat" cmpd="sng">
+            <a:solidFill>
+              <a:srgbClr val="000000"/>
+            </a:solidFill>
+            <a:prstDash val="solid"/>
+            <a:round/>
+            <a:headEnd type="none" w="sm" len="sm"/>
+            <a:tailEnd type="none" w="sm" len="sm"/>
+          </a:ln>
+        </p:spPr>
+      </p:sp>
+      <p:sp>
+        <p:nvSpPr>
+          <p:cNvPr id="76" name="Google Shape;76;p5:notes"/>
+          <p:cNvSpPr txBox="1">
+            <a:spLocks noGrp="1"/>
+          </p:cNvSpPr>
+          <p:nvPr>
+            <p:ph type="body" idx="1"/>
+          </p:nvPr>
+        </p:nvSpPr>
+        <p:spPr>
+          <a:xfrm>
+            <a:off x="685800" y="4343400"/>
+            <a:ext cx="5486400" cy="4114800"/>
+          </a:xfrm>
+          <a:prstGeom prst="rect">
+            <a:avLst/>
+          </a:prstGeom>
+          <a:noFill/>
+          <a:ln>
+            <a:noFill/>
+          </a:ln>
+        </p:spPr>
+        <p:txBody>
+          <a:bodyPr spcFirstLastPara="1" wrap="square" lIns="91425" tIns="91425" rIns="91425" bIns="91425" anchor="t" anchorCtr="0">
+            <a:noAutofit/>
+          </a:bodyPr>
+          <a:lstStyle/>
+          <a:p>
+            <a:pPr marL="0" lvl="0" indent="0" algn="l" rtl="0">
+              <a:lnSpc>
+                <a:spcPct val="100000"/>
+              </a:lnSpc>
+              <a:spcBef>
+                <a:spcPts val="0"/>
+              </a:spcBef>
+              <a:spcAft>
+                <a:spcPts val="0"/>
+              </a:spcAft>
+              <a:buSzPts val="1100"/>
+              <a:buNone/>
+            </a:pPr>
+            <a:endParaRPr/>
+          </a:p>
+        </p:txBody>
+      </p:sp>
+    </p:spTree>
+    <p:extLst>
+      <p:ext uri="{BB962C8B-B14F-4D97-AF65-F5344CB8AC3E}">
+        <p14:creationId xmlns:p14="http://schemas.microsoft.com/office/powerpoint/2010/main" val="494987230"/>
+      </p:ext>
+    </p:extLst>
+  </p:cSld>
+  <p:clrMapOvr>
+    <a:masterClrMapping/>
+  </p:clrMapOvr>
+</p:notes>
+</file>
+
+<file path=ppt/notesSlides/notesSlide8.xml><?xml version="1.0" encoding="utf-8"?>
+<p:notes xmlns:a="http://schemas.openxmlformats.org/drawingml/2006/main" xmlns:r="http://schemas.openxmlformats.org/officeDocument/2006/relationships" xmlns:p="http://schemas.openxmlformats.org/presentationml/2006/main" showMasterSp="0" showMasterPhAnim="0">
+  <p:cSld>
+    <p:spTree>
+      <p:nvGrpSpPr>
+        <p:cNvPr id="1" name="Shape 74"/>
+        <p:cNvGrpSpPr/>
+        <p:nvPr/>
+      </p:nvGrpSpPr>
+      <p:grpSpPr>
+        <a:xfrm>
+          <a:off x="0" y="0"/>
+          <a:ext cx="0" cy="0"/>
+          <a:chOff x="0" y="0"/>
+          <a:chExt cx="0" cy="0"/>
+        </a:xfrm>
+      </p:grpSpPr>
+      <p:sp>
+        <p:nvSpPr>
+          <p:cNvPr id="75" name="Google Shape;75;p5:notes"/>
+          <p:cNvSpPr>
+            <a:spLocks noGrp="1" noRot="1" noChangeAspect="1"/>
+          </p:cNvSpPr>
+          <p:nvPr>
+            <p:ph type="sldImg" idx="2"/>
+          </p:nvPr>
+        </p:nvSpPr>
+        <p:spPr>
+          <a:xfrm>
+            <a:off x="381000" y="685800"/>
+            <a:ext cx="6096000" cy="3429000"/>
+          </a:xfrm>
+          <a:custGeom>
+            <a:avLst/>
+            <a:gdLst/>
+            <a:ahLst/>
+            <a:cxnLst/>
+            <a:rect l="l" t="t" r="r" b="b"/>
+            <a:pathLst>
+              <a:path w="120000" h="120000" extrusionOk="0">
+                <a:moveTo>
+                  <a:pt x="0" y="0"/>
+                </a:moveTo>
+                <a:lnTo>
+                  <a:pt x="120000" y="0"/>
+                </a:lnTo>
+                <a:lnTo>
+                  <a:pt x="120000" y="120000"/>
+                </a:lnTo>
+                <a:lnTo>
+                  <a:pt x="0" y="120000"/>
+                </a:lnTo>
+                <a:close/>
+              </a:path>
+            </a:pathLst>
+          </a:custGeom>
+          <a:noFill/>
+          <a:ln w="9525" cap="flat" cmpd="sng">
+            <a:solidFill>
+              <a:srgbClr val="000000"/>
+            </a:solidFill>
+            <a:prstDash val="solid"/>
+            <a:round/>
+            <a:headEnd type="none" w="sm" len="sm"/>
+            <a:tailEnd type="none" w="sm" len="sm"/>
+          </a:ln>
+        </p:spPr>
+      </p:sp>
+      <p:sp>
+        <p:nvSpPr>
+          <p:cNvPr id="76" name="Google Shape;76;p5:notes"/>
+          <p:cNvSpPr txBox="1">
+            <a:spLocks noGrp="1"/>
+          </p:cNvSpPr>
+          <p:nvPr>
+            <p:ph type="body" idx="1"/>
+          </p:nvPr>
+        </p:nvSpPr>
+        <p:spPr>
+          <a:xfrm>
+            <a:off x="685800" y="4343400"/>
+            <a:ext cx="5486400" cy="4114800"/>
+          </a:xfrm>
+          <a:prstGeom prst="rect">
+            <a:avLst/>
+          </a:prstGeom>
+          <a:noFill/>
+          <a:ln>
+            <a:noFill/>
+          </a:ln>
+        </p:spPr>
+        <p:txBody>
+          <a:bodyPr spcFirstLastPara="1" wrap="square" lIns="91425" tIns="91425" rIns="91425" bIns="91425" anchor="t" anchorCtr="0">
+            <a:noAutofit/>
+          </a:bodyPr>
+          <a:lstStyle/>
+          <a:p>
+            <a:pPr marL="0" lvl="0" indent="0" algn="l" rtl="0">
+              <a:lnSpc>
+                <a:spcPct val="100000"/>
+              </a:lnSpc>
+              <a:spcBef>
+                <a:spcPts val="0"/>
+              </a:spcBef>
+              <a:spcAft>
+                <a:spcPts val="0"/>
+              </a:spcAft>
+              <a:buSzPts val="1100"/>
+              <a:buNone/>
+            </a:pPr>
+            <a:endParaRPr/>
+          </a:p>
+        </p:txBody>
+      </p:sp>
+    </p:spTree>
+    <p:extLst>
+      <p:ext uri="{BB962C8B-B14F-4D97-AF65-F5344CB8AC3E}">
+        <p14:creationId xmlns:p14="http://schemas.microsoft.com/office/powerpoint/2010/main" val="2046727851"/>
+      </p:ext>
+    </p:extLst>
+  </p:cSld>
+  <p:clrMapOvr>
+    <a:masterClrMapping/>
+  </p:clrMapOvr>
+</p:notes>
+</file>
+
+<file path=ppt/notesSlides/notesSlide9.xml><?xml version="1.0" encoding="utf-8"?>
 <p:notes xmlns:a="http://schemas.openxmlformats.org/drawingml/2006/main" xmlns:r="http://schemas.openxmlformats.org/officeDocument/2006/relationships" xmlns:p="http://schemas.openxmlformats.org/presentationml/2006/main" showMasterSp="0" showMasterPhAnim="0">
   <p:cSld>
     <p:spTree>
@@ -1746,132 +2128,6 @@
               <a:buSzPts val="1100"/>
               <a:buNone/>
             </a:pPr>
-            <a:endParaRPr/>
-          </a:p>
-        </p:txBody>
-      </p:sp>
-    </p:spTree>
-  </p:cSld>
-  <p:clrMapOvr>
-    <a:masterClrMapping/>
-  </p:clrMapOvr>
-</p:notes>
-</file>
-
-<file path=ppt/notesSlides/notesSlide8.xml><?xml version="1.0" encoding="utf-8"?>
-<p:notes xmlns:a="http://schemas.openxmlformats.org/drawingml/2006/main" xmlns:r="http://schemas.openxmlformats.org/officeDocument/2006/relationships" xmlns:p="http://schemas.openxmlformats.org/presentationml/2006/main" showMasterSp="0" showMasterPhAnim="0">
-  <p:cSld>
-    <p:spTree>
-      <p:nvGrpSpPr>
-        <p:cNvPr id="1" name="Shape 86"/>
-        <p:cNvGrpSpPr/>
-        <p:nvPr/>
-      </p:nvGrpSpPr>
-      <p:grpSpPr>
-        <a:xfrm>
-          <a:off x="0" y="0"/>
-          <a:ext cx="0" cy="0"/>
-          <a:chOff x="0" y="0"/>
-          <a:chExt cx="0" cy="0"/>
-        </a:xfrm>
-      </p:grpSpPr>
-      <p:sp>
-        <p:nvSpPr>
-          <p:cNvPr id="87" name="Google Shape;87;p7:notes"/>
-          <p:cNvSpPr>
-            <a:spLocks noGrp="1" noRot="1" noChangeAspect="1"/>
-          </p:cNvSpPr>
-          <p:nvPr>
-            <p:ph type="sldImg" idx="2"/>
-          </p:nvPr>
-        </p:nvSpPr>
-        <p:spPr>
-          <a:xfrm>
-            <a:off x="381300" y="685800"/>
-            <a:ext cx="6096000" cy="3429000"/>
-          </a:xfrm>
-          <a:custGeom>
-            <a:avLst/>
-            <a:gdLst/>
-            <a:ahLst/>
-            <a:cxnLst/>
-            <a:rect l="l" t="t" r="r" b="b"/>
-            <a:pathLst>
-              <a:path w="120000" h="120000" extrusionOk="0">
-                <a:moveTo>
-                  <a:pt x="0" y="0"/>
-                </a:moveTo>
-                <a:lnTo>
-                  <a:pt x="120000" y="0"/>
-                </a:lnTo>
-                <a:lnTo>
-                  <a:pt x="120000" y="120000"/>
-                </a:lnTo>
-                <a:lnTo>
-                  <a:pt x="0" y="120000"/>
-                </a:lnTo>
-                <a:close/>
-              </a:path>
-            </a:pathLst>
-          </a:custGeom>
-          <a:noFill/>
-          <a:ln w="9525" cap="flat" cmpd="sng">
-            <a:solidFill>
-              <a:srgbClr val="000000"/>
-            </a:solidFill>
-            <a:prstDash val="solid"/>
-            <a:round/>
-            <a:headEnd type="none" w="sm" len="sm"/>
-            <a:tailEnd type="none" w="sm" len="sm"/>
-          </a:ln>
-        </p:spPr>
-      </p:sp>
-      <p:sp>
-        <p:nvSpPr>
-          <p:cNvPr id="88" name="Google Shape;88;p7:notes"/>
-          <p:cNvSpPr txBox="1">
-            <a:spLocks noGrp="1"/>
-          </p:cNvSpPr>
-          <p:nvPr>
-            <p:ph type="body" idx="1"/>
-          </p:nvPr>
-        </p:nvSpPr>
-        <p:spPr>
-          <a:xfrm>
-            <a:off x="685800" y="4343400"/>
-            <a:ext cx="5486400" cy="4114800"/>
-          </a:xfrm>
-          <a:prstGeom prst="rect">
-            <a:avLst/>
-          </a:prstGeom>
-          <a:noFill/>
-          <a:ln>
-            <a:noFill/>
-          </a:ln>
-        </p:spPr>
-        <p:txBody>
-          <a:bodyPr spcFirstLastPara="1" wrap="square" lIns="91425" tIns="91425" rIns="91425" bIns="91425" anchor="t" anchorCtr="0">
-            <a:noAutofit/>
-          </a:bodyPr>
-          <a:lstStyle/>
-          <a:p>
-            <a:pPr marL="0" lvl="0" indent="0" algn="l" rtl="0">
-              <a:lnSpc>
-                <a:spcPct val="100000"/>
-              </a:lnSpc>
-              <a:spcBef>
-                <a:spcPts val="0"/>
-              </a:spcBef>
-              <a:spcAft>
-                <a:spcPts val="0"/>
-              </a:spcAft>
-              <a:buSzPts val="1100"/>
-              <a:buNone/>
-            </a:pPr>
-            <a:r>
-              <a:rPr lang="en"/>
-              <a:t>Discusses how the information from planning, testing and trialling of components assisted in the development of a high-quality outcome</a:t>
-            </a:r>
             <a:endParaRPr/>
           </a:p>
         </p:txBody>
@@ -9731,21 +9987,14 @@
           </a:bodyPr>
           <a:lstStyle/>
           <a:p>
-            <a:pPr marL="0" lvl="0" indent="0" rtl="0">
-              <a:lnSpc>
-                <a:spcPct val="100000"/>
-              </a:lnSpc>
-              <a:spcBef>
-                <a:spcPts val="0"/>
-              </a:spcBef>
-              <a:spcAft>
-                <a:spcPts val="0"/>
-              </a:spcAft>
+            <a:pPr marL="0" indent="0">
+              <a:lnSpc>
+                <a:spcPct val="100000"/>
+              </a:lnSpc>
               <a:buClr>
                 <a:schemeClr val="dk1"/>
               </a:buClr>
               <a:buSzPts val="1100"/>
-              <a:buFont typeface="Arial"/>
               <a:buNone/>
             </a:pPr>
             <a:r>
@@ -9763,30 +10012,40 @@
                 </a:solidFill>
                 <a:hlinkClick r:id="rId3"/>
               </a:rPr>
-              <a:t>https://github.com/21308/AS91896---AS91897</a:t>
+              <a:t>GitHub Repository </a:t>
             </a:r>
-            <a:endParaRPr sz="2000" b="1" dirty="0">
+            <a:endParaRPr lang="en" sz="2000" b="1" dirty="0">
               <a:solidFill>
                 <a:srgbClr val="274E13"/>
               </a:solidFill>
             </a:endParaRPr>
           </a:p>
           <a:p>
-            <a:pPr marL="0" lvl="0" indent="0" algn="l" rtl="0">
-              <a:lnSpc>
-                <a:spcPct val="100000"/>
-              </a:lnSpc>
-              <a:spcBef>
-                <a:spcPts val="0"/>
-              </a:spcBef>
-              <a:spcAft>
-                <a:spcPts val="0"/>
-              </a:spcAft>
+            <a:pPr marL="0" indent="0">
+              <a:lnSpc>
+                <a:spcPct val="100000"/>
+              </a:lnSpc>
               <a:buClr>
                 <a:schemeClr val="dk1"/>
               </a:buClr>
               <a:buSzPts val="1100"/>
-              <a:buFont typeface="Arial"/>
+              <a:buNone/>
+            </a:pPr>
+            <a:endParaRPr lang="en-US" sz="2000" dirty="0">
+              <a:solidFill>
+                <a:srgbClr val="274E13"/>
+              </a:solidFill>
+            </a:endParaRPr>
+          </a:p>
+          <a:p>
+            <a:pPr marL="0" indent="0">
+              <a:lnSpc>
+                <a:spcPct val="100000"/>
+              </a:lnSpc>
+              <a:buClr>
+                <a:schemeClr val="dk1"/>
+              </a:buClr>
+              <a:buSzPts val="1100"/>
               <a:buNone/>
             </a:pPr>
             <a:endParaRPr sz="2000" dirty="0">
@@ -9796,21 +10055,14 @@
             </a:endParaRPr>
           </a:p>
           <a:p>
-            <a:pPr marL="0" lvl="0" indent="0" algn="l" rtl="0">
-              <a:lnSpc>
-                <a:spcPct val="100000"/>
-              </a:lnSpc>
-              <a:spcBef>
-                <a:spcPts val="0"/>
-              </a:spcBef>
-              <a:spcAft>
-                <a:spcPts val="0"/>
-              </a:spcAft>
+            <a:pPr marL="0" lvl="0" indent="0">
+              <a:lnSpc>
+                <a:spcPct val="100000"/>
+              </a:lnSpc>
               <a:buClr>
                 <a:schemeClr val="dk1"/>
               </a:buClr>
               <a:buSzPts val="1100"/>
-              <a:buFont typeface="Arial"/>
               <a:buNone/>
             </a:pPr>
             <a:r>
@@ -9819,7 +10071,7 @@
                   <a:srgbClr val="274E13"/>
                 </a:solidFill>
               </a:rPr>
-              <a:t>Links to trello board / project management tools: </a:t>
+              <a:t>Links to trello board / project: </a:t>
             </a:r>
             <a:r>
               <a:rPr lang="en-NZ" sz="2000" b="1" dirty="0">
@@ -9828,9 +10080,13 @@
                 </a:solidFill>
                 <a:hlinkClick r:id="rId4"/>
               </a:rPr>
-              <a:t>https://trello.com/b/VkkabcYw/as-91896-91897</a:t>
+              <a:t>Trello Board</a:t>
             </a:r>
-            <a:endParaRPr sz="2000" dirty="0"/>
+            <a:endParaRPr lang="en" sz="2000" b="1" dirty="0">
+              <a:solidFill>
+                <a:srgbClr val="274E13"/>
+              </a:solidFill>
+            </a:endParaRPr>
           </a:p>
         </p:txBody>
       </p:sp>
@@ -9922,6 +10178,93 @@
 </p:sld>
 </file>
 
+<file path=ppt/slides/slide10.xml><?xml version="1.0" encoding="utf-8"?>
+<p:sld xmlns:a="http://schemas.openxmlformats.org/drawingml/2006/main" xmlns:r="http://schemas.openxmlformats.org/officeDocument/2006/relationships" xmlns:p="http://schemas.openxmlformats.org/presentationml/2006/main">
+  <p:cSld>
+    <p:bg>
+      <p:bgPr>
+        <a:solidFill>
+          <a:srgbClr val="FFE599"/>
+        </a:solidFill>
+        <a:effectLst/>
+      </p:bgPr>
+    </p:bg>
+    <p:spTree>
+      <p:nvGrpSpPr>
+        <p:cNvPr id="1" name="Shape 89"/>
+        <p:cNvGrpSpPr/>
+        <p:nvPr/>
+      </p:nvGrpSpPr>
+      <p:grpSpPr>
+        <a:xfrm>
+          <a:off x="0" y="0"/>
+          <a:ext cx="0" cy="0"/>
+          <a:chOff x="0" y="0"/>
+          <a:chExt cx="0" cy="0"/>
+        </a:xfrm>
+      </p:grpSpPr>
+      <p:sp>
+        <p:nvSpPr>
+          <p:cNvPr id="90" name="Google Shape;90;p19"/>
+          <p:cNvSpPr txBox="1">
+            <a:spLocks noGrp="1"/>
+          </p:cNvSpPr>
+          <p:nvPr>
+            <p:ph type="body" idx="1"/>
+          </p:nvPr>
+        </p:nvSpPr>
+        <p:spPr>
+          <a:xfrm>
+            <a:off x="311700" y="397700"/>
+            <a:ext cx="8520600" cy="4171200"/>
+          </a:xfrm>
+          <a:prstGeom prst="rect">
+            <a:avLst/>
+          </a:prstGeom>
+          <a:noFill/>
+          <a:ln>
+            <a:noFill/>
+          </a:ln>
+        </p:spPr>
+        <p:txBody>
+          <a:bodyPr spcFirstLastPara="1" wrap="square" lIns="91425" tIns="91425" rIns="91425" bIns="91425" anchor="t" anchorCtr="0">
+            <a:noAutofit/>
+          </a:bodyPr>
+          <a:lstStyle/>
+          <a:p>
+            <a:pPr marL="0" lvl="0" indent="0" algn="l" rtl="0">
+              <a:lnSpc>
+                <a:spcPct val="115000"/>
+              </a:lnSpc>
+              <a:spcBef>
+                <a:spcPts val="0"/>
+              </a:spcBef>
+              <a:spcAft>
+                <a:spcPts val="1600"/>
+              </a:spcAft>
+              <a:buSzPts val="1800"/>
+              <a:buNone/>
+            </a:pPr>
+            <a:r>
+              <a:rPr lang="en" b="1" i="1">
+                <a:solidFill>
+                  <a:srgbClr val="595959"/>
+                </a:solidFill>
+              </a:rPr>
+              <a:t>Discusses how the information from planning, testing and trialling of components assisted in the development of a high-quality outcome</a:t>
+            </a:r>
+            <a:endParaRPr/>
+          </a:p>
+        </p:txBody>
+      </p:sp>
+    </p:spTree>
+  </p:cSld>
+  <p:clrMapOvr>
+    <a:masterClrMapping/>
+  </p:clrMapOvr>
+</p:sld>
+</file>
+
 <file path=ppt/slides/slide2.xml><?xml version="1.0" encoding="utf-8"?>
 <p:sld xmlns:a="http://schemas.openxmlformats.org/drawingml/2006/main" xmlns:r="http://schemas.openxmlformats.org/officeDocument/2006/relationships" xmlns:p="http://schemas.openxmlformats.org/presentationml/2006/main">
   <p:cSld>
@@ -10476,6 +10819,36 @@
           </a:p>
         </p:txBody>
       </p:sp>
+      <p:pic>
+        <p:nvPicPr>
+          <p:cNvPr id="2" name="Picture 1">
+            <a:extLst>
+              <a:ext uri="{FF2B5EF4-FFF2-40B4-BE49-F238E27FC236}">
+                <a16:creationId xmlns:a16="http://schemas.microsoft.com/office/drawing/2014/main" id="{EED5599C-CF31-4D99-86CD-D827D02C2B23}"/>
+              </a:ext>
+            </a:extLst>
+          </p:cNvPr>
+          <p:cNvPicPr>
+            <a:picLocks noChangeAspect="1"/>
+          </p:cNvPicPr>
+          <p:nvPr/>
+        </p:nvPicPr>
+        <p:blipFill>
+          <a:blip r:embed="rId3"/>
+          <a:stretch>
+            <a:fillRect/>
+          </a:stretch>
+        </p:blipFill>
+        <p:spPr>
+          <a:xfrm>
+            <a:off x="150059" y="2468025"/>
+            <a:ext cx="1922790" cy="2333274"/>
+          </a:xfrm>
+          <a:prstGeom prst="rect">
+            <a:avLst/>
+          </a:prstGeom>
+        </p:spPr>
+      </p:pic>
     </p:spTree>
   </p:cSld>
   <p:clrMapOvr>
@@ -10538,24 +10911,15 @@
           </a:bodyPr>
           <a:lstStyle/>
           <a:p>
-            <a:pPr marL="0" lvl="0" indent="0" algn="l" rtl="0">
-              <a:lnSpc>
-                <a:spcPct val="100000"/>
-              </a:lnSpc>
-              <a:spcBef>
-                <a:spcPts val="0"/>
-              </a:spcBef>
-              <a:spcAft>
-                <a:spcPts val="0"/>
-              </a:spcAft>
-              <a:buSzPts val="2800"/>
-              <a:buNone/>
-            </a:pPr>
+            <a:r>
+              <a:rPr lang="en" dirty="0"/>
+              <a:t>Component 1 (Trello </a:t>
+            </a:r>
             <a:r>
               <a:rPr lang="en"/>
-              <a:t>Component 1 (Trello screenshot)</a:t>
+              <a:t>screenshot)</a:t>
             </a:r>
-            <a:endParaRPr/>
+            <a:endParaRPr lang="en-NZ"/>
           </a:p>
         </p:txBody>
       </p:sp>
@@ -10638,11 +11002,17 @@
         <p:nvGraphicFramePr>
           <p:cNvPr id="79" name="Google Shape;79;p17"/>
           <p:cNvGraphicFramePr/>
-          <p:nvPr/>
+          <p:nvPr>
+            <p:extLst>
+              <p:ext uri="{D42A27DB-BD31-4B8C-83A1-F6EECF244321}">
+                <p14:modId xmlns:p14="http://schemas.microsoft.com/office/powerpoint/2010/main" val="1289270127"/>
+              </p:ext>
+            </p:extLst>
+          </p:nvPr>
         </p:nvGraphicFramePr>
         <p:xfrm>
           <a:off x="382475" y="1267725"/>
-          <a:ext cx="8520600" cy="914340"/>
+          <a:ext cx="8520600" cy="3383220"/>
         </p:xfrm>
         <a:graphic>
           <a:graphicData uri="http://schemas.openxmlformats.org/drawingml/2006/table">
@@ -10726,10 +11096,10 @@
                         <a:buNone/>
                       </a:pPr>
                       <a:r>
-                        <a:rPr lang="en" sz="1800" b="1" u="none" strike="noStrike" cap="none"/>
+                        <a:rPr lang="en" sz="1800" b="1" u="none" strike="noStrike" cap="none" dirty="0"/>
                         <a:t>Expected Values</a:t>
                       </a:r>
-                      <a:endParaRPr sz="1800" b="1" u="none" strike="noStrike" cap="none"/>
+                      <a:endParaRPr sz="1800" b="1" u="none" strike="noStrike" cap="none" dirty="0"/>
                     </a:p>
                   </a:txBody>
                   <a:tcPr marL="91425" marR="91425" marT="91425" marB="91425">
@@ -10767,7 +11137,170 @@
                         <a:buFont typeface="Arial"/>
                         <a:buNone/>
                       </a:pPr>
-                      <a:endParaRPr sz="1800" u="none" strike="noStrike" cap="none"/>
+                      <a:r>
+                        <a:rPr lang="en-US" sz="1800" u="none" strike="noStrike" cap="none" dirty="0"/>
+                        <a:t>Check that the user inputs a numerical number for their budget.  </a:t>
+                      </a:r>
+                    </a:p>
+                    <a:p>
+                      <a:pPr marL="0" marR="0" lvl="0" indent="0" algn="l" rtl="0">
+                        <a:lnSpc>
+                          <a:spcPct val="100000"/>
+                        </a:lnSpc>
+                        <a:spcBef>
+                          <a:spcPts val="0"/>
+                        </a:spcBef>
+                        <a:spcAft>
+                          <a:spcPts val="0"/>
+                        </a:spcAft>
+                        <a:buClr>
+                          <a:srgbClr val="000000"/>
+                        </a:buClr>
+                        <a:buSzPts val="1800"/>
+                        <a:buFont typeface="Arial"/>
+                        <a:buNone/>
+                      </a:pPr>
+                      <a:endParaRPr lang="en-US" sz="1800" u="none" strike="noStrike" cap="none" dirty="0"/>
+                    </a:p>
+                    <a:p>
+                      <a:pPr marL="0" marR="0" lvl="0" indent="0" algn="l" rtl="0">
+                        <a:lnSpc>
+                          <a:spcPct val="100000"/>
+                        </a:lnSpc>
+                        <a:spcBef>
+                          <a:spcPts val="0"/>
+                        </a:spcBef>
+                        <a:spcAft>
+                          <a:spcPts val="0"/>
+                        </a:spcAft>
+                        <a:buClr>
+                          <a:srgbClr val="000000"/>
+                        </a:buClr>
+                        <a:buSzPts val="1800"/>
+                        <a:buFont typeface="Arial"/>
+                        <a:buNone/>
+                      </a:pPr>
+                      <a:endParaRPr lang="en-US" sz="1800" u="none" strike="noStrike" cap="none" dirty="0"/>
+                    </a:p>
+                    <a:p>
+                      <a:pPr marL="0" marR="0" lvl="0" indent="0" algn="l" rtl="0">
+                        <a:lnSpc>
+                          <a:spcPct val="100000"/>
+                        </a:lnSpc>
+                        <a:spcBef>
+                          <a:spcPts val="0"/>
+                        </a:spcBef>
+                        <a:spcAft>
+                          <a:spcPts val="0"/>
+                        </a:spcAft>
+                        <a:buClr>
+                          <a:srgbClr val="000000"/>
+                        </a:buClr>
+                        <a:buSzPts val="1800"/>
+                        <a:buFont typeface="Arial"/>
+                        <a:buNone/>
+                      </a:pPr>
+                      <a:endParaRPr lang="en-US" sz="1800" u="none" strike="noStrike" cap="none" dirty="0"/>
+                    </a:p>
+                    <a:p>
+                      <a:pPr marL="0" marR="0" lvl="0" indent="0" algn="l" rtl="0">
+                        <a:lnSpc>
+                          <a:spcPct val="100000"/>
+                        </a:lnSpc>
+                        <a:spcBef>
+                          <a:spcPts val="0"/>
+                        </a:spcBef>
+                        <a:spcAft>
+                          <a:spcPts val="0"/>
+                        </a:spcAft>
+                        <a:buClr>
+                          <a:srgbClr val="000000"/>
+                        </a:buClr>
+                        <a:buSzPts val="1800"/>
+                        <a:buFont typeface="Arial"/>
+                        <a:buNone/>
+                      </a:pPr>
+                      <a:endParaRPr lang="en-US" sz="1800" u="none" strike="noStrike" cap="none" dirty="0"/>
+                    </a:p>
+                    <a:p>
+                      <a:pPr marL="0" marR="0" lvl="0" indent="0" algn="l" rtl="0">
+                        <a:lnSpc>
+                          <a:spcPct val="100000"/>
+                        </a:lnSpc>
+                        <a:spcBef>
+                          <a:spcPts val="0"/>
+                        </a:spcBef>
+                        <a:spcAft>
+                          <a:spcPts val="0"/>
+                        </a:spcAft>
+                        <a:buClr>
+                          <a:srgbClr val="000000"/>
+                        </a:buClr>
+                        <a:buSzPts val="1800"/>
+                        <a:buFont typeface="Arial"/>
+                        <a:buNone/>
+                      </a:pPr>
+                      <a:endParaRPr lang="en-US" sz="1800" u="none" strike="noStrike" cap="none" dirty="0"/>
+                    </a:p>
+                    <a:p>
+                      <a:pPr marL="0" marR="0" lvl="0" indent="0" algn="l" rtl="0">
+                        <a:lnSpc>
+                          <a:spcPct val="100000"/>
+                        </a:lnSpc>
+                        <a:spcBef>
+                          <a:spcPts val="0"/>
+                        </a:spcBef>
+                        <a:spcAft>
+                          <a:spcPts val="0"/>
+                        </a:spcAft>
+                        <a:buClr>
+                          <a:srgbClr val="000000"/>
+                        </a:buClr>
+                        <a:buSzPts val="1800"/>
+                        <a:buFont typeface="Arial"/>
+                        <a:buNone/>
+                      </a:pPr>
+                      <a:endParaRPr lang="en-US" sz="1800" u="none" strike="noStrike" cap="none" dirty="0"/>
+                    </a:p>
+                    <a:p>
+                      <a:pPr marL="0" marR="0" lvl="0" indent="0" algn="l" rtl="0">
+                        <a:lnSpc>
+                          <a:spcPct val="100000"/>
+                        </a:lnSpc>
+                        <a:spcBef>
+                          <a:spcPts val="0"/>
+                        </a:spcBef>
+                        <a:spcAft>
+                          <a:spcPts val="0"/>
+                        </a:spcAft>
+                        <a:buClr>
+                          <a:srgbClr val="000000"/>
+                        </a:buClr>
+                        <a:buSzPts val="1800"/>
+                        <a:buFont typeface="Arial"/>
+                        <a:buNone/>
+                      </a:pPr>
+                      <a:endParaRPr lang="en-US" sz="1800" u="none" strike="noStrike" cap="none" dirty="0"/>
+                    </a:p>
+                    <a:p>
+                      <a:pPr marL="0" marR="0" lvl="0" indent="0" algn="l" rtl="0">
+                        <a:lnSpc>
+                          <a:spcPct val="100000"/>
+                        </a:lnSpc>
+                        <a:spcBef>
+                          <a:spcPts val="0"/>
+                        </a:spcBef>
+                        <a:spcAft>
+                          <a:spcPts val="0"/>
+                        </a:spcAft>
+                        <a:buClr>
+                          <a:srgbClr val="000000"/>
+                        </a:buClr>
+                        <a:buSzPts val="1800"/>
+                        <a:buFont typeface="Arial"/>
+                        <a:buNone/>
+                      </a:pPr>
+                      <a:endParaRPr sz="1800" u="none" strike="noStrike" cap="none" dirty="0"/>
                     </a:p>
                   </a:txBody>
                   <a:tcPr marL="91425" marR="91425" marT="91425" marB="91425"/>
@@ -10794,7 +11327,941 @@
                         <a:buFont typeface="Arial"/>
                         <a:buNone/>
                       </a:pPr>
-                      <a:endParaRPr sz="1800" u="none" strike="noStrike" cap="none"/>
+                      <a:r>
+                        <a:rPr lang="en-US" sz="1800" u="none" strike="noStrike" cap="none" dirty="0"/>
+                        <a:t>If they don’t enter a numerical number, it will output “Sorry we really need to know your budget to help you, then it will re ask what the user wants their budget to be.” </a:t>
+                      </a:r>
+                      <a:endParaRPr sz="1800" u="none" strike="noStrike" cap="none" dirty="0"/>
+                    </a:p>
+                  </a:txBody>
+                  <a:tcPr marL="91425" marR="91425" marT="91425" marB="91425"/>
+                </a:tc>
+                <a:extLst>
+                  <a:ext uri="{0D108BD9-81ED-4DB2-BD59-A6C34878D82A}">
+                    <a16:rowId xmlns:a16="http://schemas.microsoft.com/office/drawing/2014/main" val="10001"/>
+                  </a:ext>
+                </a:extLst>
+              </a:tr>
+            </a:tbl>
+          </a:graphicData>
+        </a:graphic>
+      </p:graphicFrame>
+      <p:pic>
+        <p:nvPicPr>
+          <p:cNvPr id="2" name="Picture 1">
+            <a:extLst>
+              <a:ext uri="{FF2B5EF4-FFF2-40B4-BE49-F238E27FC236}">
+                <a16:creationId xmlns:a16="http://schemas.microsoft.com/office/drawing/2014/main" id="{86A1EBB4-FB1A-4CF9-A2DF-4E41DA10E1CC}"/>
+              </a:ext>
+            </a:extLst>
+          </p:cNvPr>
+          <p:cNvPicPr>
+            <a:picLocks noChangeAspect="1"/>
+          </p:cNvPicPr>
+          <p:nvPr/>
+        </p:nvPicPr>
+        <p:blipFill>
+          <a:blip r:embed="rId3"/>
+          <a:stretch>
+            <a:fillRect/>
+          </a:stretch>
+        </p:blipFill>
+        <p:spPr>
+          <a:xfrm>
+            <a:off x="573838" y="2668782"/>
+            <a:ext cx="3858163" cy="581106"/>
+          </a:xfrm>
+          <a:prstGeom prst="rect">
+            <a:avLst/>
+          </a:prstGeom>
+        </p:spPr>
+      </p:pic>
+    </p:spTree>
+  </p:cSld>
+  <p:clrMapOvr>
+    <a:masterClrMapping/>
+  </p:clrMapOvr>
+</p:sld>
+</file>
+
+<file path=ppt/slides/slide7.xml><?xml version="1.0" encoding="utf-8"?>
+<p:sld xmlns:a="http://schemas.openxmlformats.org/drawingml/2006/main" xmlns:r="http://schemas.openxmlformats.org/officeDocument/2006/relationships" xmlns:p="http://schemas.openxmlformats.org/presentationml/2006/main">
+  <p:cSld>
+    <p:spTree>
+      <p:nvGrpSpPr>
+        <p:cNvPr id="1" name="Shape 77"/>
+        <p:cNvGrpSpPr/>
+        <p:nvPr/>
+      </p:nvGrpSpPr>
+      <p:grpSpPr>
+        <a:xfrm>
+          <a:off x="0" y="0"/>
+          <a:ext cx="0" cy="0"/>
+          <a:chOff x="0" y="0"/>
+          <a:chExt cx="0" cy="0"/>
+        </a:xfrm>
+      </p:grpSpPr>
+      <p:sp>
+        <p:nvSpPr>
+          <p:cNvPr id="78" name="Google Shape;78;p17"/>
+          <p:cNvSpPr txBox="1">
+            <a:spLocks noGrp="1"/>
+          </p:cNvSpPr>
+          <p:nvPr>
+            <p:ph type="title"/>
+          </p:nvPr>
+        </p:nvSpPr>
+        <p:spPr>
+          <a:xfrm>
+            <a:off x="311700" y="445025"/>
+            <a:ext cx="8520600" cy="572700"/>
+          </a:xfrm>
+          <a:prstGeom prst="rect">
+            <a:avLst/>
+          </a:prstGeom>
+          <a:noFill/>
+          <a:ln>
+            <a:noFill/>
+          </a:ln>
+        </p:spPr>
+        <p:txBody>
+          <a:bodyPr spcFirstLastPara="1" wrap="square" lIns="91425" tIns="91425" rIns="91425" bIns="91425" anchor="t" anchorCtr="0">
+            <a:noAutofit/>
+          </a:bodyPr>
+          <a:lstStyle/>
+          <a:p>
+            <a:pPr marL="0" lvl="0" indent="0" algn="l" rtl="0">
+              <a:lnSpc>
+                <a:spcPct val="100000"/>
+              </a:lnSpc>
+              <a:spcBef>
+                <a:spcPts val="0"/>
+              </a:spcBef>
+              <a:spcAft>
+                <a:spcPts val="0"/>
+              </a:spcAft>
+              <a:buSzPts val="2800"/>
+              <a:buNone/>
+            </a:pPr>
+            <a:r>
+              <a:rPr lang="en" dirty="0"/>
+              <a:t>Component 2 - Test Plan (?and screenshot)</a:t>
+            </a:r>
+            <a:endParaRPr dirty="0"/>
+          </a:p>
+        </p:txBody>
+      </p:sp>
+      <p:graphicFrame>
+        <p:nvGraphicFramePr>
+          <p:cNvPr id="79" name="Google Shape;79;p17"/>
+          <p:cNvGraphicFramePr/>
+          <p:nvPr>
+            <p:extLst>
+              <p:ext uri="{D42A27DB-BD31-4B8C-83A1-F6EECF244321}">
+                <p14:modId xmlns:p14="http://schemas.microsoft.com/office/powerpoint/2010/main" val="258970153"/>
+              </p:ext>
+            </p:extLst>
+          </p:nvPr>
+        </p:nvGraphicFramePr>
+        <p:xfrm>
+          <a:off x="382475" y="1267725"/>
+          <a:ext cx="8520600" cy="3383220"/>
+        </p:xfrm>
+        <a:graphic>
+          <a:graphicData uri="http://schemas.openxmlformats.org/drawingml/2006/table">
+            <a:tbl>
+              <a:tblPr>
+                <a:noFill/>
+                <a:tableStyleId>{B1FD213A-B2DF-4DBF-93ED-7FCBC85D3277}</a:tableStyleId>
+              </a:tblPr>
+              <a:tblGrid>
+                <a:gridCol w="4260300">
+                  <a:extLst>
+                    <a:ext uri="{9D8B030D-6E8A-4147-A177-3AD203B41FA5}">
+                      <a16:colId xmlns:a16="http://schemas.microsoft.com/office/drawing/2014/main" val="20000"/>
+                    </a:ext>
+                  </a:extLst>
+                </a:gridCol>
+                <a:gridCol w="4260300">
+                  <a:extLst>
+                    <a:ext uri="{9D8B030D-6E8A-4147-A177-3AD203B41FA5}">
+                      <a16:colId xmlns:a16="http://schemas.microsoft.com/office/drawing/2014/main" val="20001"/>
+                    </a:ext>
+                  </a:extLst>
+                </a:gridCol>
+              </a:tblGrid>
+              <a:tr h="381000">
+                <a:tc>
+                  <a:txBody>
+                    <a:bodyPr/>
+                    <a:lstStyle/>
+                    <a:p>
+                      <a:pPr marL="0" marR="0" lvl="0" indent="0" algn="l" rtl="0">
+                        <a:lnSpc>
+                          <a:spcPct val="100000"/>
+                        </a:lnSpc>
+                        <a:spcBef>
+                          <a:spcPts val="0"/>
+                        </a:spcBef>
+                        <a:spcAft>
+                          <a:spcPts val="0"/>
+                        </a:spcAft>
+                        <a:buClr>
+                          <a:srgbClr val="000000"/>
+                        </a:buClr>
+                        <a:buSzPts val="1800"/>
+                        <a:buFont typeface="Arial"/>
+                        <a:buNone/>
+                      </a:pPr>
+                      <a:r>
+                        <a:rPr lang="en" sz="1800" b="1" u="none" strike="noStrike" cap="none"/>
+                        <a:t>Test Case</a:t>
+                      </a:r>
+                      <a:endParaRPr sz="1800" b="1" u="none" strike="noStrike" cap="none"/>
+                    </a:p>
+                  </a:txBody>
+                  <a:tcPr marL="91425" marR="91425" marT="91425" marB="91425">
+                    <a:solidFill>
+                      <a:srgbClr val="CCCCCC"/>
+                    </a:solidFill>
+                  </a:tcPr>
+                </a:tc>
+                <a:tc>
+                  <a:txBody>
+                    <a:bodyPr/>
+                    <a:lstStyle/>
+                    <a:p>
+                      <a:pPr marL="0" marR="0" lvl="0" indent="0" algn="l" rtl="0">
+                        <a:lnSpc>
+                          <a:spcPct val="100000"/>
+                        </a:lnSpc>
+                        <a:spcBef>
+                          <a:spcPts val="0"/>
+                        </a:spcBef>
+                        <a:spcAft>
+                          <a:spcPts val="0"/>
+                        </a:spcAft>
+                        <a:buClr>
+                          <a:srgbClr val="000000"/>
+                        </a:buClr>
+                        <a:buSzPts val="1800"/>
+                        <a:buFont typeface="Arial"/>
+                        <a:buNone/>
+                      </a:pPr>
+                      <a:r>
+                        <a:rPr lang="en" sz="1800" b="1" u="none" strike="noStrike" cap="none" dirty="0"/>
+                        <a:t>Expected Values</a:t>
+                      </a:r>
+                      <a:endParaRPr sz="1800" b="1" u="none" strike="noStrike" cap="none" dirty="0"/>
+                    </a:p>
+                  </a:txBody>
+                  <a:tcPr marL="91425" marR="91425" marT="91425" marB="91425">
+                    <a:solidFill>
+                      <a:srgbClr val="CCCCCC"/>
+                    </a:solidFill>
+                  </a:tcPr>
+                </a:tc>
+                <a:extLst>
+                  <a:ext uri="{0D108BD9-81ED-4DB2-BD59-A6C34878D82A}">
+                    <a16:rowId xmlns:a16="http://schemas.microsoft.com/office/drawing/2014/main" val="10000"/>
+                  </a:ext>
+                </a:extLst>
+              </a:tr>
+              <a:tr h="396200">
+                <a:tc>
+                  <a:txBody>
+                    <a:bodyPr/>
+                    <a:lstStyle/>
+                    <a:p>
+                      <a:pPr marL="0" marR="0" lvl="0" indent="0" algn="l" rtl="0">
+                        <a:lnSpc>
+                          <a:spcPct val="100000"/>
+                        </a:lnSpc>
+                        <a:spcBef>
+                          <a:spcPts val="0"/>
+                        </a:spcBef>
+                        <a:spcAft>
+                          <a:spcPts val="0"/>
+                        </a:spcAft>
+                        <a:buClr>
+                          <a:srgbClr val="000000"/>
+                        </a:buClr>
+                        <a:buSzPts val="1800"/>
+                        <a:buFont typeface="Arial"/>
+                        <a:buNone/>
+                      </a:pPr>
+                      <a:r>
+                        <a:rPr lang="en-US" sz="1800" u="none" strike="noStrike" cap="none" dirty="0"/>
+                        <a:t>Check that the user inputs a numerical number for their budget.  </a:t>
+                      </a:r>
+                    </a:p>
+                    <a:p>
+                      <a:pPr marL="0" marR="0" lvl="0" indent="0" algn="l" rtl="0">
+                        <a:lnSpc>
+                          <a:spcPct val="100000"/>
+                        </a:lnSpc>
+                        <a:spcBef>
+                          <a:spcPts val="0"/>
+                        </a:spcBef>
+                        <a:spcAft>
+                          <a:spcPts val="0"/>
+                        </a:spcAft>
+                        <a:buClr>
+                          <a:srgbClr val="000000"/>
+                        </a:buClr>
+                        <a:buSzPts val="1800"/>
+                        <a:buFont typeface="Arial"/>
+                        <a:buNone/>
+                      </a:pPr>
+                      <a:endParaRPr lang="en-US" sz="1800" u="none" strike="noStrike" cap="none" dirty="0"/>
+                    </a:p>
+                    <a:p>
+                      <a:pPr marL="0" marR="0" lvl="0" indent="0" algn="l" rtl="0">
+                        <a:lnSpc>
+                          <a:spcPct val="100000"/>
+                        </a:lnSpc>
+                        <a:spcBef>
+                          <a:spcPts val="0"/>
+                        </a:spcBef>
+                        <a:spcAft>
+                          <a:spcPts val="0"/>
+                        </a:spcAft>
+                        <a:buClr>
+                          <a:srgbClr val="000000"/>
+                        </a:buClr>
+                        <a:buSzPts val="1800"/>
+                        <a:buFont typeface="Arial"/>
+                        <a:buNone/>
+                      </a:pPr>
+                      <a:endParaRPr lang="en-US" sz="1800" u="none" strike="noStrike" cap="none" dirty="0"/>
+                    </a:p>
+                    <a:p>
+                      <a:pPr marL="0" marR="0" lvl="0" indent="0" algn="l" rtl="0">
+                        <a:lnSpc>
+                          <a:spcPct val="100000"/>
+                        </a:lnSpc>
+                        <a:spcBef>
+                          <a:spcPts val="0"/>
+                        </a:spcBef>
+                        <a:spcAft>
+                          <a:spcPts val="0"/>
+                        </a:spcAft>
+                        <a:buClr>
+                          <a:srgbClr val="000000"/>
+                        </a:buClr>
+                        <a:buSzPts val="1800"/>
+                        <a:buFont typeface="Arial"/>
+                        <a:buNone/>
+                      </a:pPr>
+                      <a:endParaRPr lang="en-US" sz="1800" u="none" strike="noStrike" cap="none" dirty="0"/>
+                    </a:p>
+                    <a:p>
+                      <a:pPr marL="0" marR="0" lvl="0" indent="0" algn="l" rtl="0">
+                        <a:lnSpc>
+                          <a:spcPct val="100000"/>
+                        </a:lnSpc>
+                        <a:spcBef>
+                          <a:spcPts val="0"/>
+                        </a:spcBef>
+                        <a:spcAft>
+                          <a:spcPts val="0"/>
+                        </a:spcAft>
+                        <a:buClr>
+                          <a:srgbClr val="000000"/>
+                        </a:buClr>
+                        <a:buSzPts val="1800"/>
+                        <a:buFont typeface="Arial"/>
+                        <a:buNone/>
+                      </a:pPr>
+                      <a:endParaRPr lang="en-US" sz="1800" u="none" strike="noStrike" cap="none" dirty="0"/>
+                    </a:p>
+                    <a:p>
+                      <a:pPr marL="0" marR="0" lvl="0" indent="0" algn="l" rtl="0">
+                        <a:lnSpc>
+                          <a:spcPct val="100000"/>
+                        </a:lnSpc>
+                        <a:spcBef>
+                          <a:spcPts val="0"/>
+                        </a:spcBef>
+                        <a:spcAft>
+                          <a:spcPts val="0"/>
+                        </a:spcAft>
+                        <a:buClr>
+                          <a:srgbClr val="000000"/>
+                        </a:buClr>
+                        <a:buSzPts val="1800"/>
+                        <a:buFont typeface="Arial"/>
+                        <a:buNone/>
+                      </a:pPr>
+                      <a:endParaRPr lang="en-US" sz="1800" u="none" strike="noStrike" cap="none" dirty="0"/>
+                    </a:p>
+                    <a:p>
+                      <a:pPr marL="0" marR="0" lvl="0" indent="0" algn="l" rtl="0">
+                        <a:lnSpc>
+                          <a:spcPct val="100000"/>
+                        </a:lnSpc>
+                        <a:spcBef>
+                          <a:spcPts val="0"/>
+                        </a:spcBef>
+                        <a:spcAft>
+                          <a:spcPts val="0"/>
+                        </a:spcAft>
+                        <a:buClr>
+                          <a:srgbClr val="000000"/>
+                        </a:buClr>
+                        <a:buSzPts val="1800"/>
+                        <a:buFont typeface="Arial"/>
+                        <a:buNone/>
+                      </a:pPr>
+                      <a:endParaRPr lang="en-US" sz="1800" u="none" strike="noStrike" cap="none" dirty="0"/>
+                    </a:p>
+                    <a:p>
+                      <a:pPr marL="0" marR="0" lvl="0" indent="0" algn="l" rtl="0">
+                        <a:lnSpc>
+                          <a:spcPct val="100000"/>
+                        </a:lnSpc>
+                        <a:spcBef>
+                          <a:spcPts val="0"/>
+                        </a:spcBef>
+                        <a:spcAft>
+                          <a:spcPts val="0"/>
+                        </a:spcAft>
+                        <a:buClr>
+                          <a:srgbClr val="000000"/>
+                        </a:buClr>
+                        <a:buSzPts val="1800"/>
+                        <a:buFont typeface="Arial"/>
+                        <a:buNone/>
+                      </a:pPr>
+                      <a:endParaRPr lang="en-US" sz="1800" u="none" strike="noStrike" cap="none" dirty="0"/>
+                    </a:p>
+                    <a:p>
+                      <a:pPr marL="0" marR="0" lvl="0" indent="0" algn="l" rtl="0">
+                        <a:lnSpc>
+                          <a:spcPct val="100000"/>
+                        </a:lnSpc>
+                        <a:spcBef>
+                          <a:spcPts val="0"/>
+                        </a:spcBef>
+                        <a:spcAft>
+                          <a:spcPts val="0"/>
+                        </a:spcAft>
+                        <a:buClr>
+                          <a:srgbClr val="000000"/>
+                        </a:buClr>
+                        <a:buSzPts val="1800"/>
+                        <a:buFont typeface="Arial"/>
+                        <a:buNone/>
+                      </a:pPr>
+                      <a:endParaRPr sz="1800" u="none" strike="noStrike" cap="none" dirty="0"/>
+                    </a:p>
+                  </a:txBody>
+                  <a:tcPr marL="91425" marR="91425" marT="91425" marB="91425"/>
+                </a:tc>
+                <a:tc>
+                  <a:txBody>
+                    <a:bodyPr/>
+                    <a:lstStyle/>
+                    <a:p>
+                      <a:pPr marL="0" marR="0" lvl="0" indent="0" algn="l" defTabSz="914400" rtl="0" eaLnBrk="1" fontAlgn="auto" latinLnBrk="0" hangingPunct="1">
+                        <a:lnSpc>
+                          <a:spcPct val="100000"/>
+                        </a:lnSpc>
+                        <a:spcBef>
+                          <a:spcPts val="0"/>
+                        </a:spcBef>
+                        <a:spcAft>
+                          <a:spcPts val="0"/>
+                        </a:spcAft>
+                        <a:buClr>
+                          <a:srgbClr val="000000"/>
+                        </a:buClr>
+                        <a:buSzPts val="1800"/>
+                        <a:buFont typeface="Arial"/>
+                        <a:buNone/>
+                        <a:tabLst/>
+                        <a:defRPr/>
+                      </a:pPr>
+                      <a:r>
+                        <a:rPr lang="en-US" sz="1800" u="none" strike="noStrike" cap="none" dirty="0"/>
+                        <a:t>If they enter a numerical number, it will output “</a:t>
+                      </a:r>
+                      <a:r>
+                        <a:rPr lang="en-NZ" sz="1400" b="0" i="0" u="none" strike="noStrike" cap="none" dirty="0">
+                          <a:solidFill>
+                            <a:srgbClr val="000000"/>
+                          </a:solidFill>
+                          <a:effectLst/>
+                          <a:latin typeface="Arial"/>
+                          <a:cs typeface="Arial"/>
+                          <a:sym typeface="Arial"/>
+                        </a:rPr>
+                        <a:t>Yo</a:t>
+                      </a:r>
+                      <a:r>
+                        <a:rPr lang="en-NZ" sz="1400" b="0" i="0" u="none" strike="noStrike" cap="none" dirty="0">
+                          <a:solidFill>
+                            <a:srgbClr val="000000"/>
+                          </a:solidFill>
+                          <a:effectLst/>
+                          <a:latin typeface="Arial"/>
+                          <a:ea typeface="Arial"/>
+                          <a:cs typeface="Arial"/>
+                          <a:sym typeface="Arial"/>
+                        </a:rPr>
+                        <a:t>ur total budget is: $ (users input)”</a:t>
+                      </a:r>
+                    </a:p>
+                    <a:p>
+                      <a:pPr marL="0" marR="0" lvl="0" indent="0" algn="l" rtl="0">
+                        <a:lnSpc>
+                          <a:spcPct val="100000"/>
+                        </a:lnSpc>
+                        <a:spcBef>
+                          <a:spcPts val="0"/>
+                        </a:spcBef>
+                        <a:spcAft>
+                          <a:spcPts val="0"/>
+                        </a:spcAft>
+                        <a:buClr>
+                          <a:srgbClr val="000000"/>
+                        </a:buClr>
+                        <a:buSzPts val="1800"/>
+                        <a:buFont typeface="Arial"/>
+                        <a:buNone/>
+                      </a:pPr>
+                      <a:endParaRPr sz="1800" u="none" strike="noStrike" cap="none" dirty="0"/>
+                    </a:p>
+                  </a:txBody>
+                  <a:tcPr marL="91425" marR="91425" marT="91425" marB="91425"/>
+                </a:tc>
+                <a:extLst>
+                  <a:ext uri="{0D108BD9-81ED-4DB2-BD59-A6C34878D82A}">
+                    <a16:rowId xmlns:a16="http://schemas.microsoft.com/office/drawing/2014/main" val="10001"/>
+                  </a:ext>
+                </a:extLst>
+              </a:tr>
+            </a:tbl>
+          </a:graphicData>
+        </a:graphic>
+      </p:graphicFrame>
+      <p:pic>
+        <p:nvPicPr>
+          <p:cNvPr id="3" name="Picture 2">
+            <a:extLst>
+              <a:ext uri="{FF2B5EF4-FFF2-40B4-BE49-F238E27FC236}">
+                <a16:creationId xmlns:a16="http://schemas.microsoft.com/office/drawing/2014/main" id="{7F7F5546-E04F-4003-A5D9-1ED078631A7A}"/>
+              </a:ext>
+            </a:extLst>
+          </p:cNvPr>
+          <p:cNvPicPr>
+            <a:picLocks noChangeAspect="1"/>
+          </p:cNvPicPr>
+          <p:nvPr/>
+        </p:nvPicPr>
+        <p:blipFill>
+          <a:blip r:embed="rId3"/>
+          <a:stretch>
+            <a:fillRect/>
+          </a:stretch>
+        </p:blipFill>
+        <p:spPr>
+          <a:xfrm>
+            <a:off x="594930" y="3207884"/>
+            <a:ext cx="3896028" cy="667891"/>
+          </a:xfrm>
+          <a:prstGeom prst="rect">
+            <a:avLst/>
+          </a:prstGeom>
+        </p:spPr>
+      </p:pic>
+    </p:spTree>
+    <p:extLst>
+      <p:ext uri="{BB962C8B-B14F-4D97-AF65-F5344CB8AC3E}">
+        <p14:creationId xmlns:p14="http://schemas.microsoft.com/office/powerpoint/2010/main" val="449295417"/>
+      </p:ext>
+    </p:extLst>
+  </p:cSld>
+  <p:clrMapOvr>
+    <a:masterClrMapping/>
+  </p:clrMapOvr>
+</p:sld>
+</file>
+
+<file path=ppt/slides/slide8.xml><?xml version="1.0" encoding="utf-8"?>
+<p:sld xmlns:a="http://schemas.openxmlformats.org/drawingml/2006/main" xmlns:r="http://schemas.openxmlformats.org/officeDocument/2006/relationships" xmlns:p="http://schemas.openxmlformats.org/presentationml/2006/main">
+  <p:cSld>
+    <p:spTree>
+      <p:nvGrpSpPr>
+        <p:cNvPr id="1" name="Shape 77"/>
+        <p:cNvGrpSpPr/>
+        <p:nvPr/>
+      </p:nvGrpSpPr>
+      <p:grpSpPr>
+        <a:xfrm>
+          <a:off x="0" y="0"/>
+          <a:ext cx="0" cy="0"/>
+          <a:chOff x="0" y="0"/>
+          <a:chExt cx="0" cy="0"/>
+        </a:xfrm>
+      </p:grpSpPr>
+      <p:sp>
+        <p:nvSpPr>
+          <p:cNvPr id="78" name="Google Shape;78;p17"/>
+          <p:cNvSpPr txBox="1">
+            <a:spLocks noGrp="1"/>
+          </p:cNvSpPr>
+          <p:nvPr>
+            <p:ph type="title"/>
+          </p:nvPr>
+        </p:nvSpPr>
+        <p:spPr>
+          <a:xfrm>
+            <a:off x="311700" y="445025"/>
+            <a:ext cx="8520600" cy="572700"/>
+          </a:xfrm>
+          <a:prstGeom prst="rect">
+            <a:avLst/>
+          </a:prstGeom>
+          <a:noFill/>
+          <a:ln>
+            <a:noFill/>
+          </a:ln>
+        </p:spPr>
+        <p:txBody>
+          <a:bodyPr spcFirstLastPara="1" wrap="square" lIns="91425" tIns="91425" rIns="91425" bIns="91425" anchor="t" anchorCtr="0">
+            <a:noAutofit/>
+          </a:bodyPr>
+          <a:lstStyle/>
+          <a:p>
+            <a:pPr marL="0" lvl="0" indent="0" algn="l" rtl="0">
+              <a:lnSpc>
+                <a:spcPct val="100000"/>
+              </a:lnSpc>
+              <a:spcBef>
+                <a:spcPts val="0"/>
+              </a:spcBef>
+              <a:spcAft>
+                <a:spcPts val="0"/>
+              </a:spcAft>
+              <a:buSzPts val="2800"/>
+              <a:buNone/>
+            </a:pPr>
+            <a:r>
+              <a:rPr lang="en" dirty="0"/>
+              <a:t>Component 3 - Test Plan (?and screenshot)</a:t>
+            </a:r>
+            <a:endParaRPr dirty="0"/>
+          </a:p>
+        </p:txBody>
+      </p:sp>
+      <p:graphicFrame>
+        <p:nvGraphicFramePr>
+          <p:cNvPr id="79" name="Google Shape;79;p17"/>
+          <p:cNvGraphicFramePr/>
+          <p:nvPr>
+            <p:extLst>
+              <p:ext uri="{D42A27DB-BD31-4B8C-83A1-F6EECF244321}">
+                <p14:modId xmlns:p14="http://schemas.microsoft.com/office/powerpoint/2010/main" val="3077191999"/>
+              </p:ext>
+            </p:extLst>
+          </p:nvPr>
+        </p:nvGraphicFramePr>
+        <p:xfrm>
+          <a:off x="382475" y="1267725"/>
+          <a:ext cx="8520600" cy="2834580"/>
+        </p:xfrm>
+        <a:graphic>
+          <a:graphicData uri="http://schemas.openxmlformats.org/drawingml/2006/table">
+            <a:tbl>
+              <a:tblPr>
+                <a:noFill/>
+                <a:tableStyleId>{B1FD213A-B2DF-4DBF-93ED-7FCBC85D3277}</a:tableStyleId>
+              </a:tblPr>
+              <a:tblGrid>
+                <a:gridCol w="4260300">
+                  <a:extLst>
+                    <a:ext uri="{9D8B030D-6E8A-4147-A177-3AD203B41FA5}">
+                      <a16:colId xmlns:a16="http://schemas.microsoft.com/office/drawing/2014/main" val="20000"/>
+                    </a:ext>
+                  </a:extLst>
+                </a:gridCol>
+                <a:gridCol w="4260300">
+                  <a:extLst>
+                    <a:ext uri="{9D8B030D-6E8A-4147-A177-3AD203B41FA5}">
+                      <a16:colId xmlns:a16="http://schemas.microsoft.com/office/drawing/2014/main" val="20001"/>
+                    </a:ext>
+                  </a:extLst>
+                </a:gridCol>
+              </a:tblGrid>
+              <a:tr h="381000">
+                <a:tc>
+                  <a:txBody>
+                    <a:bodyPr/>
+                    <a:lstStyle/>
+                    <a:p>
+                      <a:pPr marL="0" marR="0" lvl="0" indent="0" algn="l" rtl="0">
+                        <a:lnSpc>
+                          <a:spcPct val="100000"/>
+                        </a:lnSpc>
+                        <a:spcBef>
+                          <a:spcPts val="0"/>
+                        </a:spcBef>
+                        <a:spcAft>
+                          <a:spcPts val="0"/>
+                        </a:spcAft>
+                        <a:buClr>
+                          <a:srgbClr val="000000"/>
+                        </a:buClr>
+                        <a:buSzPts val="1800"/>
+                        <a:buFont typeface="Arial"/>
+                        <a:buNone/>
+                      </a:pPr>
+                      <a:r>
+                        <a:rPr lang="en" sz="1800" b="1" u="none" strike="noStrike" cap="none"/>
+                        <a:t>Test Case</a:t>
+                      </a:r>
+                      <a:endParaRPr sz="1800" b="1" u="none" strike="noStrike" cap="none"/>
+                    </a:p>
+                  </a:txBody>
+                  <a:tcPr marL="91425" marR="91425" marT="91425" marB="91425">
+                    <a:solidFill>
+                      <a:srgbClr val="CCCCCC"/>
+                    </a:solidFill>
+                  </a:tcPr>
+                </a:tc>
+                <a:tc>
+                  <a:txBody>
+                    <a:bodyPr/>
+                    <a:lstStyle/>
+                    <a:p>
+                      <a:pPr marL="0" marR="0" lvl="0" indent="0" algn="l" rtl="0">
+                        <a:lnSpc>
+                          <a:spcPct val="100000"/>
+                        </a:lnSpc>
+                        <a:spcBef>
+                          <a:spcPts val="0"/>
+                        </a:spcBef>
+                        <a:spcAft>
+                          <a:spcPts val="0"/>
+                        </a:spcAft>
+                        <a:buClr>
+                          <a:srgbClr val="000000"/>
+                        </a:buClr>
+                        <a:buSzPts val="1800"/>
+                        <a:buFont typeface="Arial"/>
+                        <a:buNone/>
+                      </a:pPr>
+                      <a:r>
+                        <a:rPr lang="en" sz="1800" b="1" u="none" strike="noStrike" cap="none" dirty="0"/>
+                        <a:t>Expected Values</a:t>
+                      </a:r>
+                      <a:endParaRPr sz="1800" b="1" u="none" strike="noStrike" cap="none" dirty="0"/>
+                    </a:p>
+                  </a:txBody>
+                  <a:tcPr marL="91425" marR="91425" marT="91425" marB="91425">
+                    <a:solidFill>
+                      <a:srgbClr val="CCCCCC"/>
+                    </a:solidFill>
+                  </a:tcPr>
+                </a:tc>
+                <a:extLst>
+                  <a:ext uri="{0D108BD9-81ED-4DB2-BD59-A6C34878D82A}">
+                    <a16:rowId xmlns:a16="http://schemas.microsoft.com/office/drawing/2014/main" val="10000"/>
+                  </a:ext>
+                </a:extLst>
+              </a:tr>
+              <a:tr h="396200">
+                <a:tc>
+                  <a:txBody>
+                    <a:bodyPr/>
+                    <a:lstStyle/>
+                    <a:p>
+                      <a:pPr marL="0" marR="0" lvl="0" indent="0" algn="l" rtl="0">
+                        <a:lnSpc>
+                          <a:spcPct val="100000"/>
+                        </a:lnSpc>
+                        <a:spcBef>
+                          <a:spcPts val="0"/>
+                        </a:spcBef>
+                        <a:spcAft>
+                          <a:spcPts val="0"/>
+                        </a:spcAft>
+                        <a:buClr>
+                          <a:srgbClr val="000000"/>
+                        </a:buClr>
+                        <a:buSzPts val="1800"/>
+                        <a:buFont typeface="Arial"/>
+                        <a:buNone/>
+                      </a:pPr>
+                      <a:endParaRPr lang="en-US" sz="1800" u="none" strike="noStrike" cap="none" dirty="0"/>
+                    </a:p>
+                    <a:p>
+                      <a:pPr marL="0" marR="0" lvl="0" indent="0" algn="l" rtl="0">
+                        <a:lnSpc>
+                          <a:spcPct val="100000"/>
+                        </a:lnSpc>
+                        <a:spcBef>
+                          <a:spcPts val="0"/>
+                        </a:spcBef>
+                        <a:spcAft>
+                          <a:spcPts val="0"/>
+                        </a:spcAft>
+                        <a:buClr>
+                          <a:srgbClr val="000000"/>
+                        </a:buClr>
+                        <a:buSzPts val="1800"/>
+                        <a:buFont typeface="Arial"/>
+                        <a:buNone/>
+                      </a:pPr>
+                      <a:endParaRPr lang="en-US" sz="1800" u="none" strike="noStrike" cap="none" dirty="0"/>
+                    </a:p>
+                    <a:p>
+                      <a:pPr marL="0" marR="0" lvl="0" indent="0" algn="l" rtl="0">
+                        <a:lnSpc>
+                          <a:spcPct val="100000"/>
+                        </a:lnSpc>
+                        <a:spcBef>
+                          <a:spcPts val="0"/>
+                        </a:spcBef>
+                        <a:spcAft>
+                          <a:spcPts val="0"/>
+                        </a:spcAft>
+                        <a:buClr>
+                          <a:srgbClr val="000000"/>
+                        </a:buClr>
+                        <a:buSzPts val="1800"/>
+                        <a:buFont typeface="Arial"/>
+                        <a:buNone/>
+                      </a:pPr>
+                      <a:endParaRPr lang="en-US" sz="1800" u="none" strike="noStrike" cap="none" dirty="0"/>
+                    </a:p>
+                    <a:p>
+                      <a:pPr marL="0" marR="0" lvl="0" indent="0" algn="l" rtl="0">
+                        <a:lnSpc>
+                          <a:spcPct val="100000"/>
+                        </a:lnSpc>
+                        <a:spcBef>
+                          <a:spcPts val="0"/>
+                        </a:spcBef>
+                        <a:spcAft>
+                          <a:spcPts val="0"/>
+                        </a:spcAft>
+                        <a:buClr>
+                          <a:srgbClr val="000000"/>
+                        </a:buClr>
+                        <a:buSzPts val="1800"/>
+                        <a:buFont typeface="Arial"/>
+                        <a:buNone/>
+                      </a:pPr>
+                      <a:endParaRPr lang="en-US" sz="1800" u="none" strike="noStrike" cap="none" dirty="0"/>
+                    </a:p>
+                    <a:p>
+                      <a:pPr marL="0" marR="0" lvl="0" indent="0" algn="l" rtl="0">
+                        <a:lnSpc>
+                          <a:spcPct val="100000"/>
+                        </a:lnSpc>
+                        <a:spcBef>
+                          <a:spcPts val="0"/>
+                        </a:spcBef>
+                        <a:spcAft>
+                          <a:spcPts val="0"/>
+                        </a:spcAft>
+                        <a:buClr>
+                          <a:srgbClr val="000000"/>
+                        </a:buClr>
+                        <a:buSzPts val="1800"/>
+                        <a:buFont typeface="Arial"/>
+                        <a:buNone/>
+                      </a:pPr>
+                      <a:endParaRPr lang="en-US" sz="1800" u="none" strike="noStrike" cap="none" dirty="0"/>
+                    </a:p>
+                    <a:p>
+                      <a:pPr marL="0" marR="0" lvl="0" indent="0" algn="l" rtl="0">
+                        <a:lnSpc>
+                          <a:spcPct val="100000"/>
+                        </a:lnSpc>
+                        <a:spcBef>
+                          <a:spcPts val="0"/>
+                        </a:spcBef>
+                        <a:spcAft>
+                          <a:spcPts val="0"/>
+                        </a:spcAft>
+                        <a:buClr>
+                          <a:srgbClr val="000000"/>
+                        </a:buClr>
+                        <a:buSzPts val="1800"/>
+                        <a:buFont typeface="Arial"/>
+                        <a:buNone/>
+                      </a:pPr>
+                      <a:endParaRPr lang="en-US" sz="1800" u="none" strike="noStrike" cap="none" dirty="0"/>
+                    </a:p>
+                    <a:p>
+                      <a:pPr marL="0" marR="0" lvl="0" indent="0" algn="l" rtl="0">
+                        <a:lnSpc>
+                          <a:spcPct val="100000"/>
+                        </a:lnSpc>
+                        <a:spcBef>
+                          <a:spcPts val="0"/>
+                        </a:spcBef>
+                        <a:spcAft>
+                          <a:spcPts val="0"/>
+                        </a:spcAft>
+                        <a:buClr>
+                          <a:srgbClr val="000000"/>
+                        </a:buClr>
+                        <a:buSzPts val="1800"/>
+                        <a:buFont typeface="Arial"/>
+                        <a:buNone/>
+                      </a:pPr>
+                      <a:endParaRPr lang="en-US" sz="1800" u="none" strike="noStrike" cap="none" dirty="0"/>
+                    </a:p>
+                    <a:p>
+                      <a:pPr marL="0" marR="0" lvl="0" indent="0" algn="l" rtl="0">
+                        <a:lnSpc>
+                          <a:spcPct val="100000"/>
+                        </a:lnSpc>
+                        <a:spcBef>
+                          <a:spcPts val="0"/>
+                        </a:spcBef>
+                        <a:spcAft>
+                          <a:spcPts val="0"/>
+                        </a:spcAft>
+                        <a:buClr>
+                          <a:srgbClr val="000000"/>
+                        </a:buClr>
+                        <a:buSzPts val="1800"/>
+                        <a:buFont typeface="Arial"/>
+                        <a:buNone/>
+                      </a:pPr>
+                      <a:endParaRPr sz="1800" u="none" strike="noStrike" cap="none" dirty="0"/>
+                    </a:p>
+                  </a:txBody>
+                  <a:tcPr marL="91425" marR="91425" marT="91425" marB="91425"/>
+                </a:tc>
+                <a:tc>
+                  <a:txBody>
+                    <a:bodyPr/>
+                    <a:lstStyle/>
+                    <a:p>
+                      <a:pPr marL="0" marR="0" lvl="0" indent="0" algn="l" rtl="0">
+                        <a:lnSpc>
+                          <a:spcPct val="100000"/>
+                        </a:lnSpc>
+                        <a:spcBef>
+                          <a:spcPts val="0"/>
+                        </a:spcBef>
+                        <a:spcAft>
+                          <a:spcPts val="0"/>
+                        </a:spcAft>
+                        <a:buClr>
+                          <a:srgbClr val="000000"/>
+                        </a:buClr>
+                        <a:buSzPts val="1800"/>
+                        <a:buFont typeface="Arial"/>
+                        <a:buNone/>
+                      </a:pPr>
+                      <a:endParaRPr sz="1800" u="none" strike="noStrike" cap="none" dirty="0"/>
                     </a:p>
                   </a:txBody>
                   <a:tcPr marL="91425" marR="91425" marT="91425" marB="91425"/>
@@ -10810,6 +12277,11 @@
         </a:graphic>
       </p:graphicFrame>
     </p:spTree>
+    <p:extLst>
+      <p:ext uri="{BB962C8B-B14F-4D97-AF65-F5344CB8AC3E}">
+        <p14:creationId xmlns:p14="http://schemas.microsoft.com/office/powerpoint/2010/main" val="698751594"/>
+      </p:ext>
+    </p:extLst>
   </p:cSld>
   <p:clrMapOvr>
     <a:masterClrMapping/>
@@ -10817,7 +12289,7 @@
 </p:sld>
 </file>
 
-<file path=ppt/slides/slide7.xml><?xml version="1.0" encoding="utf-8"?>
+<file path=ppt/slides/slide9.xml><?xml version="1.0" encoding="utf-8"?>
 <p:sld xmlns:a="http://schemas.openxmlformats.org/drawingml/2006/main" xmlns:r="http://schemas.openxmlformats.org/officeDocument/2006/relationships" xmlns:p="http://schemas.openxmlformats.org/presentationml/2006/main">
   <p:cSld>
     <p:bg>
@@ -10939,93 +12411,6 @@
               <a:t>Your version control evidence should go here.  This could be in the form of annotated screenshots which show you you managed this process or you could make a brief screencast explaining how you implemented version control.</a:t>
             </a:r>
             <a:endParaRPr i="1"/>
-          </a:p>
-        </p:txBody>
-      </p:sp>
-    </p:spTree>
-  </p:cSld>
-  <p:clrMapOvr>
-    <a:masterClrMapping/>
-  </p:clrMapOvr>
-</p:sld>
-</file>
-
-<file path=ppt/slides/slide8.xml><?xml version="1.0" encoding="utf-8"?>
-<p:sld xmlns:a="http://schemas.openxmlformats.org/drawingml/2006/main" xmlns:r="http://schemas.openxmlformats.org/officeDocument/2006/relationships" xmlns:p="http://schemas.openxmlformats.org/presentationml/2006/main">
-  <p:cSld>
-    <p:bg>
-      <p:bgPr>
-        <a:solidFill>
-          <a:srgbClr val="FFE599"/>
-        </a:solidFill>
-        <a:effectLst/>
-      </p:bgPr>
-    </p:bg>
-    <p:spTree>
-      <p:nvGrpSpPr>
-        <p:cNvPr id="1" name="Shape 89"/>
-        <p:cNvGrpSpPr/>
-        <p:nvPr/>
-      </p:nvGrpSpPr>
-      <p:grpSpPr>
-        <a:xfrm>
-          <a:off x="0" y="0"/>
-          <a:ext cx="0" cy="0"/>
-          <a:chOff x="0" y="0"/>
-          <a:chExt cx="0" cy="0"/>
-        </a:xfrm>
-      </p:grpSpPr>
-      <p:sp>
-        <p:nvSpPr>
-          <p:cNvPr id="90" name="Google Shape;90;p19"/>
-          <p:cNvSpPr txBox="1">
-            <a:spLocks noGrp="1"/>
-          </p:cNvSpPr>
-          <p:nvPr>
-            <p:ph type="body" idx="1"/>
-          </p:nvPr>
-        </p:nvSpPr>
-        <p:spPr>
-          <a:xfrm>
-            <a:off x="311700" y="397700"/>
-            <a:ext cx="8520600" cy="4171200"/>
-          </a:xfrm>
-          <a:prstGeom prst="rect">
-            <a:avLst/>
-          </a:prstGeom>
-          <a:noFill/>
-          <a:ln>
-            <a:noFill/>
-          </a:ln>
-        </p:spPr>
-        <p:txBody>
-          <a:bodyPr spcFirstLastPara="1" wrap="square" lIns="91425" tIns="91425" rIns="91425" bIns="91425" anchor="t" anchorCtr="0">
-            <a:noAutofit/>
-          </a:bodyPr>
-          <a:lstStyle/>
-          <a:p>
-            <a:pPr marL="0" lvl="0" indent="0" algn="l" rtl="0">
-              <a:lnSpc>
-                <a:spcPct val="115000"/>
-              </a:lnSpc>
-              <a:spcBef>
-                <a:spcPts val="0"/>
-              </a:spcBef>
-              <a:spcAft>
-                <a:spcPts val="1600"/>
-              </a:spcAft>
-              <a:buSzPts val="1800"/>
-              <a:buNone/>
-            </a:pPr>
-            <a:r>
-              <a:rPr lang="en" b="1" i="1">
-                <a:solidFill>
-                  <a:srgbClr val="595959"/>
-                </a:solidFill>
-              </a:rPr>
-              <a:t>Discusses how the information from planning, testing and trialling of components assisted in the development of a high-quality outcome</a:t>
-            </a:r>
-            <a:endParaRPr/>
           </a:p>
         </p:txBody>
       </p:sp>
@@ -11597,4 +12982,312 @@
   <a:objectDefaults/>
   <a:extraClrSchemeLst/>
 </a:theme>
+</file>
+
+<file path=customXml/item1.xml><?xml version="1.0" encoding="utf-8"?>
+<p:properties xmlns:p="http://schemas.microsoft.com/office/2006/metadata/properties" xmlns:xsi="http://www.w3.org/2001/XMLSchema-instance" xmlns:pc="http://schemas.microsoft.com/office/infopath/2007/PartnerControls">
+  <documentManagement>
+    <_activity xmlns="4af5908b-0075-4200-9353-6549060201c0" xsi:nil="true"/>
+  </documentManagement>
+</p:properties>
+</file>
+
+<file path=customXml/item2.xml><?xml version="1.0" encoding="utf-8"?>
+<?mso-contentType ?>
+<FormTemplates xmlns="http://schemas.microsoft.com/sharepoint/v3/contenttype/forms">
+  <Display>DocumentLibraryForm</Display>
+  <Edit>DocumentLibraryForm</Edit>
+  <New>DocumentLibraryForm</New>
+</FormTemplates>
+</file>
+
+<file path=customXml/item3.xml><?xml version="1.0" encoding="utf-8"?>
+<ct:contentTypeSchema xmlns:ct="http://schemas.microsoft.com/office/2006/metadata/contentType" xmlns:ma="http://schemas.microsoft.com/office/2006/metadata/properties/metaAttributes" ct:_="" ma:_="" ma:contentTypeName="Document" ma:contentTypeID="0x01010001794ACAC82B44459E19497CCF525B66" ma:contentTypeVersion="17" ma:contentTypeDescription="Create a new document." ma:contentTypeScope="" ma:versionID="833ba8534d6a09c7036f93f86ae4149c">
+  <xsd:schema xmlns:xsd="http://www.w3.org/2001/XMLSchema" xmlns:xs="http://www.w3.org/2001/XMLSchema" xmlns:p="http://schemas.microsoft.com/office/2006/metadata/properties" xmlns:ns3="4af5908b-0075-4200-9353-6549060201c0" xmlns:ns4="89cf53ec-cfda-4e83-a248-4a6230cf4a7e" targetNamespace="http://schemas.microsoft.com/office/2006/metadata/properties" ma:root="true" ma:fieldsID="5333ef6684ab52b1044885615c72f056" ns3:_="" ns4:_="">
+    <xsd:import namespace="4af5908b-0075-4200-9353-6549060201c0"/>
+    <xsd:import namespace="89cf53ec-cfda-4e83-a248-4a6230cf4a7e"/>
+    <xsd:element name="properties">
+      <xsd:complexType>
+        <xsd:sequence>
+          <xsd:element name="documentManagement">
+            <xsd:complexType>
+              <xsd:all>
+                <xsd:element ref="ns3:MediaServiceMetadata" minOccurs="0"/>
+                <xsd:element ref="ns3:MediaServiceFastMetadata" minOccurs="0"/>
+                <xsd:element ref="ns3:MediaLengthInSeconds" minOccurs="0"/>
+                <xsd:element ref="ns3:MediaServiceAutoKeyPoints" minOccurs="0"/>
+                <xsd:element ref="ns3:MediaServiceKeyPoints" minOccurs="0"/>
+                <xsd:element ref="ns3:MediaServiceAutoTags" minOccurs="0"/>
+                <xsd:element ref="ns3:MediaServiceGenerationTime" minOccurs="0"/>
+                <xsd:element ref="ns3:MediaServiceEventHashCode" minOccurs="0"/>
+                <xsd:element ref="ns3:MediaServiceDateTaken" minOccurs="0"/>
+                <xsd:element ref="ns3:MediaServiceOCR" minOccurs="0"/>
+                <xsd:element ref="ns3:_activity" minOccurs="0"/>
+                <xsd:element ref="ns3:MediaServiceObjectDetectorVersions" minOccurs="0"/>
+                <xsd:element ref="ns4:SharedWithUsers" minOccurs="0"/>
+                <xsd:element ref="ns4:SharedWithDetails" minOccurs="0"/>
+                <xsd:element ref="ns4:SharingHintHash" minOccurs="0"/>
+                <xsd:element ref="ns3:MediaServiceSystemTags" minOccurs="0"/>
+                <xsd:element ref="ns3:MediaServiceSearchProperties" minOccurs="0"/>
+              </xsd:all>
+            </xsd:complexType>
+          </xsd:element>
+        </xsd:sequence>
+      </xsd:complexType>
+    </xsd:element>
+  </xsd:schema>
+  <xsd:schema xmlns:xsd="http://www.w3.org/2001/XMLSchema" xmlns:xs="http://www.w3.org/2001/XMLSchema" xmlns:dms="http://schemas.microsoft.com/office/2006/documentManagement/types" xmlns:pc="http://schemas.microsoft.com/office/infopath/2007/PartnerControls" targetNamespace="4af5908b-0075-4200-9353-6549060201c0" elementFormDefault="qualified">
+    <xsd:import namespace="http://schemas.microsoft.com/office/2006/documentManagement/types"/>
+    <xsd:import namespace="http://schemas.microsoft.com/office/infopath/2007/PartnerControls"/>
+    <xsd:element name="MediaServiceMetadata" ma:index="8" nillable="true" ma:displayName="MediaServiceMetadata" ma:hidden="true" ma:internalName="MediaServiceMetadata" ma:readOnly="true">
+      <xsd:simpleType>
+        <xsd:restriction base="dms:Note"/>
+      </xsd:simpleType>
+    </xsd:element>
+    <xsd:element name="MediaServiceFastMetadata" ma:index="9" nillable="true" ma:displayName="MediaServiceFastMetadata" ma:hidden="true" ma:internalName="MediaServiceFastMetadata" ma:readOnly="true">
+      <xsd:simpleType>
+        <xsd:restriction base="dms:Note"/>
+      </xsd:simpleType>
+    </xsd:element>
+    <xsd:element name="MediaLengthInSeconds" ma:index="10" nillable="true" ma:displayName="Length (seconds)" ma:internalName="MediaLengthInSeconds" ma:readOnly="true">
+      <xsd:simpleType>
+        <xsd:restriction base="dms:Unknown"/>
+      </xsd:simpleType>
+    </xsd:element>
+    <xsd:element name="MediaServiceAutoKeyPoints" ma:index="11" nillable="true" ma:displayName="MediaServiceAutoKeyPoints" ma:hidden="true" ma:internalName="MediaServiceAutoKeyPoints" ma:readOnly="true">
+      <xsd:simpleType>
+        <xsd:restriction base="dms:Note"/>
+      </xsd:simpleType>
+    </xsd:element>
+    <xsd:element name="MediaServiceKeyPoints" ma:index="12" nillable="true" ma:displayName="KeyPoints" ma:internalName="MediaServiceKeyPoints" ma:readOnly="true">
+      <xsd:simpleType>
+        <xsd:restriction base="dms:Note">
+          <xsd:maxLength value="255"/>
+        </xsd:restriction>
+      </xsd:simpleType>
+    </xsd:element>
+    <xsd:element name="MediaServiceAutoTags" ma:index="13" nillable="true" ma:displayName="Tags" ma:internalName="MediaServiceAutoTags" ma:readOnly="true">
+      <xsd:simpleType>
+        <xsd:restriction base="dms:Text"/>
+      </xsd:simpleType>
+    </xsd:element>
+    <xsd:element name="MediaServiceGenerationTime" ma:index="14" nillable="true" ma:displayName="MediaServiceGenerationTime" ma:hidden="true" ma:internalName="MediaServiceGenerationTime" ma:readOnly="true">
+      <xsd:simpleType>
+        <xsd:restriction base="dms:Text"/>
+      </xsd:simpleType>
+    </xsd:element>
+    <xsd:element name="MediaServiceEventHashCode" ma:index="15" nillable="true" ma:displayName="MediaServiceEventHashCode" ma:hidden="true" ma:internalName="MediaServiceEventHashCode" ma:readOnly="true">
+      <xsd:simpleType>
+        <xsd:restriction base="dms:Text"/>
+      </xsd:simpleType>
+    </xsd:element>
+    <xsd:element name="MediaServiceDateTaken" ma:index="16" nillable="true" ma:displayName="MediaServiceDateTaken" ma:hidden="true" ma:internalName="MediaServiceDateTaken" ma:readOnly="true">
+      <xsd:simpleType>
+        <xsd:restriction base="dms:Text"/>
+      </xsd:simpleType>
+    </xsd:element>
+    <xsd:element name="MediaServiceOCR" ma:index="17" nillable="true" ma:displayName="Extracted Text" ma:internalName="MediaServiceOCR" ma:readOnly="true">
+      <xsd:simpleType>
+        <xsd:restriction base="dms:Note">
+          <xsd:maxLength value="255"/>
+        </xsd:restriction>
+      </xsd:simpleType>
+    </xsd:element>
+    <xsd:element name="_activity" ma:index="18" nillable="true" ma:displayName="_activity" ma:hidden="true" ma:internalName="_activity">
+      <xsd:simpleType>
+        <xsd:restriction base="dms:Note"/>
+      </xsd:simpleType>
+    </xsd:element>
+    <xsd:element name="MediaServiceObjectDetectorVersions" ma:index="19" nillable="true" ma:displayName="MediaServiceObjectDetectorVersions" ma:hidden="true" ma:indexed="true" ma:internalName="MediaServiceObjectDetectorVersions" ma:readOnly="true">
+      <xsd:simpleType>
+        <xsd:restriction base="dms:Text"/>
+      </xsd:simpleType>
+    </xsd:element>
+    <xsd:element name="MediaServiceSystemTags" ma:index="23" nillable="true" ma:displayName="MediaServiceSystemTags" ma:hidden="true" ma:internalName="MediaServiceSystemTags" ma:readOnly="true">
+      <xsd:simpleType>
+        <xsd:restriction base="dms:Note"/>
+      </xsd:simpleType>
+    </xsd:element>
+    <xsd:element name="MediaServiceSearchProperties" ma:index="24" nillable="true" ma:displayName="MediaServiceSearchProperties" ma:hidden="true" ma:internalName="MediaServiceSearchProperties" ma:readOnly="true">
+      <xsd:simpleType>
+        <xsd:restriction base="dms:Note"/>
+      </xsd:simpleType>
+    </xsd:element>
+  </xsd:schema>
+  <xsd:schema xmlns:xsd="http://www.w3.org/2001/XMLSchema" xmlns:xs="http://www.w3.org/2001/XMLSchema" xmlns:dms="http://schemas.microsoft.com/office/2006/documentManagement/types" xmlns:pc="http://schemas.microsoft.com/office/infopath/2007/PartnerControls" targetNamespace="89cf53ec-cfda-4e83-a248-4a6230cf4a7e" elementFormDefault="qualified">
+    <xsd:import namespace="http://schemas.microsoft.com/office/2006/documentManagement/types"/>
+    <xsd:import namespace="http://schemas.microsoft.com/office/infopath/2007/PartnerControls"/>
+    <xsd:element name="SharedWithUsers" ma:index="20" nillable="true" ma:displayName="Shared With" ma:internalName="SharedWithUsers" ma:readOnly="true">
+      <xsd:complexType>
+        <xsd:complexContent>
+          <xsd:extension base="dms:UserMulti">
+            <xsd:sequence>
+              <xsd:element name="UserInfo" minOccurs="0" maxOccurs="unbounded">
+                <xsd:complexType>
+                  <xsd:sequence>
+                    <xsd:element name="DisplayName" type="xsd:string" minOccurs="0"/>
+                    <xsd:element name="AccountId" type="dms:UserId" minOccurs="0" nillable="true"/>
+                    <xsd:element name="AccountType" type="xsd:string" minOccurs="0"/>
+                  </xsd:sequence>
+                </xsd:complexType>
+              </xsd:element>
+            </xsd:sequence>
+          </xsd:extension>
+        </xsd:complexContent>
+      </xsd:complexType>
+    </xsd:element>
+    <xsd:element name="SharedWithDetails" ma:index="21" nillable="true" ma:displayName="Shared With Details" ma:internalName="SharedWithDetails" ma:readOnly="true">
+      <xsd:simpleType>
+        <xsd:restriction base="dms:Note">
+          <xsd:maxLength value="255"/>
+        </xsd:restriction>
+      </xsd:simpleType>
+    </xsd:element>
+    <xsd:element name="SharingHintHash" ma:index="22" nillable="true" ma:displayName="Sharing Hint Hash" ma:hidden="true" ma:internalName="SharingHintHash" ma:readOnly="true">
+      <xsd:simpleType>
+        <xsd:restriction base="dms:Text"/>
+      </xsd:simpleType>
+    </xsd:element>
+  </xsd:schema>
+  <xsd:schema xmlns="http://schemas.openxmlformats.org/package/2006/metadata/core-properties" xmlns:xsd="http://www.w3.org/2001/XMLSchema" xmlns:xsi="http://www.w3.org/2001/XMLSchema-instance" xmlns:dc="http://purl.org/dc/elements/1.1/" xmlns:dcterms="http://purl.org/dc/terms/" xmlns:odoc="http://schemas.microsoft.com/internal/obd" targetNamespace="http://schemas.openxmlformats.org/package/2006/metadata/core-properties" elementFormDefault="qualified" attributeFormDefault="unqualified" blockDefault="#all">
+    <xsd:import namespace="http://purl.org/dc/elements/1.1/" schemaLocation="http://dublincore.org/schemas/xmls/qdc/2003/04/02/dc.xsd"/>
+    <xsd:import namespace="http://purl.org/dc/terms/" schemaLocation="http://dublincore.org/schemas/xmls/qdc/2003/04/02/dcterms.xsd"/>
+    <xsd:element name="coreProperties" type="CT_coreProperties"/>
+    <xsd:complexType name="CT_coreProperties">
+      <xsd:all>
+        <xsd:element ref="dc:creator" minOccurs="0" maxOccurs="1"/>
+        <xsd:element ref="dcterms:created" minOccurs="0" maxOccurs="1"/>
+        <xsd:element ref="dc:identifier" minOccurs="0" maxOccurs="1"/>
+        <xsd:element name="contentType" minOccurs="0" maxOccurs="1" type="xsd:string" ma:index="0" ma:displayName="Content Type"/>
+        <xsd:element ref="dc:title" minOccurs="0" maxOccurs="1" ma:index="4" ma:displayName="Title"/>
+        <xsd:element ref="dc:subject" minOccurs="0" maxOccurs="1"/>
+        <xsd:element ref="dc:description" minOccurs="0" maxOccurs="1"/>
+        <xsd:element name="keywords" minOccurs="0" maxOccurs="1" type="xsd:string"/>
+        <xsd:element ref="dc:language" minOccurs="0" maxOccurs="1"/>
+        <xsd:element name="category" minOccurs="0" maxOccurs="1" type="xsd:string"/>
+        <xsd:element name="version" minOccurs="0" maxOccurs="1" type="xsd:string"/>
+        <xsd:element name="revision" minOccurs="0" maxOccurs="1" type="xsd:string">
+          <xsd:annotation>
+            <xsd:documentation>
+                        This value indicates the number of saves or revisions. The application is responsible for updating this value after each revision.
+                    </xsd:documentation>
+          </xsd:annotation>
+        </xsd:element>
+        <xsd:element name="lastModifiedBy" minOccurs="0" maxOccurs="1" type="xsd:string"/>
+        <xsd:element ref="dcterms:modified" minOccurs="0" maxOccurs="1"/>
+        <xsd:element name="contentStatus" minOccurs="0" maxOccurs="1" type="xsd:string"/>
+      </xsd:all>
+    </xsd:complexType>
+  </xsd:schema>
+  <xs:schema xmlns:pc="http://schemas.microsoft.com/office/infopath/2007/PartnerControls" xmlns:xs="http://www.w3.org/2001/XMLSchema" targetNamespace="http://schemas.microsoft.com/office/infopath/2007/PartnerControls" elementFormDefault="qualified" attributeFormDefault="unqualified">
+    <xs:element name="Person">
+      <xs:complexType>
+        <xs:sequence>
+          <xs:element ref="pc:DisplayName" minOccurs="0"/>
+          <xs:element ref="pc:AccountId" minOccurs="0"/>
+          <xs:element ref="pc:AccountType" minOccurs="0"/>
+        </xs:sequence>
+      </xs:complexType>
+    </xs:element>
+    <xs:element name="DisplayName" type="xs:string"/>
+    <xs:element name="AccountId" type="xs:string"/>
+    <xs:element name="AccountType" type="xs:string"/>
+    <xs:element name="BDCAssociatedEntity">
+      <xs:complexType>
+        <xs:sequence>
+          <xs:element ref="pc:BDCEntity" minOccurs="0" maxOccurs="unbounded"/>
+        </xs:sequence>
+        <xs:attribute ref="pc:EntityNamespace"/>
+        <xs:attribute ref="pc:EntityName"/>
+        <xs:attribute ref="pc:SystemInstanceName"/>
+        <xs:attribute ref="pc:AssociationName"/>
+      </xs:complexType>
+    </xs:element>
+    <xs:attribute name="EntityNamespace" type="xs:string"/>
+    <xs:attribute name="EntityName" type="xs:string"/>
+    <xs:attribute name="SystemInstanceName" type="xs:string"/>
+    <xs:attribute name="AssociationName" type="xs:string"/>
+    <xs:element name="BDCEntity">
+      <xs:complexType>
+        <xs:sequence>
+          <xs:element ref="pc:EntityDisplayName" minOccurs="0"/>
+          <xs:element ref="pc:EntityInstanceReference" minOccurs="0"/>
+          <xs:element ref="pc:EntityId1" minOccurs="0"/>
+          <xs:element ref="pc:EntityId2" minOccurs="0"/>
+          <xs:element ref="pc:EntityId3" minOccurs="0"/>
+          <xs:element ref="pc:EntityId4" minOccurs="0"/>
+          <xs:element ref="pc:EntityId5" minOccurs="0"/>
+        </xs:sequence>
+      </xs:complexType>
+    </xs:element>
+    <xs:element name="EntityDisplayName" type="xs:string"/>
+    <xs:element name="EntityInstanceReference" type="xs:string"/>
+    <xs:element name="EntityId1" type="xs:string"/>
+    <xs:element name="EntityId2" type="xs:string"/>
+    <xs:element name="EntityId3" type="xs:string"/>
+    <xs:element name="EntityId4" type="xs:string"/>
+    <xs:element name="EntityId5" type="xs:string"/>
+    <xs:element name="Terms">
+      <xs:complexType>
+        <xs:sequence>
+          <xs:element ref="pc:TermInfo" minOccurs="0" maxOccurs="unbounded"/>
+        </xs:sequence>
+      </xs:complexType>
+    </xs:element>
+    <xs:element name="TermInfo">
+      <xs:complexType>
+        <xs:sequence>
+          <xs:element ref="pc:TermName" minOccurs="0"/>
+          <xs:element ref="pc:TermId" minOccurs="0"/>
+        </xs:sequence>
+      </xs:complexType>
+    </xs:element>
+    <xs:element name="TermName" type="xs:string"/>
+    <xs:element name="TermId" type="xs:string"/>
+  </xs:schema>
+</ct:contentTypeSchema>
+</file>
+
+<file path=customXml/itemProps1.xml><?xml version="1.0" encoding="utf-8"?>
+<ds:datastoreItem xmlns:ds="http://schemas.openxmlformats.org/officeDocument/2006/customXml" ds:itemID="{F0FFEF24-2BC2-466A-9B44-E0380ED29724}">
+  <ds:schemaRefs>
+    <ds:schemaRef ds:uri="http://purl.org/dc/dcmitype/"/>
+    <ds:schemaRef ds:uri="4af5908b-0075-4200-9353-6549060201c0"/>
+    <ds:schemaRef ds:uri="http://schemas.microsoft.com/office/2006/documentManagement/types"/>
+    <ds:schemaRef ds:uri="http://schemas.microsoft.com/office/infopath/2007/PartnerControls"/>
+    <ds:schemaRef ds:uri="http://purl.org/dc/terms/"/>
+    <ds:schemaRef ds:uri="http://schemas.openxmlformats.org/package/2006/metadata/core-properties"/>
+    <ds:schemaRef ds:uri="89cf53ec-cfda-4e83-a248-4a6230cf4a7e"/>
+    <ds:schemaRef ds:uri="http://schemas.microsoft.com/office/2006/metadata/properties"/>
+    <ds:schemaRef ds:uri="http://www.w3.org/XML/1998/namespace"/>
+    <ds:schemaRef ds:uri="http://purl.org/dc/elements/1.1/"/>
+  </ds:schemaRefs>
+</ds:datastoreItem>
+</file>
+
+<file path=customXml/itemProps2.xml><?xml version="1.0" encoding="utf-8"?>
+<ds:datastoreItem xmlns:ds="http://schemas.openxmlformats.org/officeDocument/2006/customXml" ds:itemID="{1F994A81-6D6B-4CA8-B4E0-62F2248E0BE1}">
+  <ds:schemaRefs>
+    <ds:schemaRef ds:uri="http://schemas.microsoft.com/sharepoint/v3/contenttype/forms"/>
+  </ds:schemaRefs>
+</ds:datastoreItem>
+</file>
+
+<file path=customXml/itemProps3.xml><?xml version="1.0" encoding="utf-8"?>
+<ds:datastoreItem xmlns:ds="http://schemas.openxmlformats.org/officeDocument/2006/customXml" ds:itemID="{5A3FCA19-E40A-460B-A7BF-C3E7DBC05CEF}">
+  <ds:schemaRefs>
+    <ds:schemaRef ds:uri="http://schemas.microsoft.com/office/2006/metadata/contentType"/>
+    <ds:schemaRef ds:uri="http://schemas.microsoft.com/office/2006/metadata/properties/metaAttributes"/>
+    <ds:schemaRef ds:uri="http://www.w3.org/2001/XMLSchema"/>
+    <ds:schemaRef ds:uri="http://schemas.microsoft.com/office/2006/metadata/properties"/>
+    <ds:schemaRef ds:uri="4af5908b-0075-4200-9353-6549060201c0"/>
+    <ds:schemaRef ds:uri="89cf53ec-cfda-4e83-a248-4a6230cf4a7e"/>
+    <ds:schemaRef ds:uri="http://schemas.microsoft.com/office/2006/documentManagement/types"/>
+    <ds:schemaRef ds:uri="http://schemas.microsoft.com/office/infopath/2007/PartnerControls"/>
+    <ds:schemaRef ds:uri="http://schemas.openxmlformats.org/package/2006/metadata/core-properties"/>
+    <ds:schemaRef ds:uri="http://purl.org/dc/elements/1.1/"/>
+    <ds:schemaRef ds:uri="http://purl.org/dc/terms/"/>
+    <ds:schemaRef ds:uri="http://schemas.microsoft.com/internal/obd"/>
+  </ds:schemaRefs>
+</ds:datastoreItem>
 </file>
</xml_diff>